<commit_message>
updated target file and presentation
</commit_message>
<xml_diff>
--- a/Tutorial/P-tutorial.pptx
+++ b/Tutorial/P-tutorial.pptx
@@ -5,7 +5,7 @@
     <p:sldMasterId id="2147483648" r:id="rId1"/>
   </p:sldMasterIdLst>
   <p:notesMasterIdLst>
-    <p:notesMasterId r:id="rId23"/>
+    <p:notesMasterId r:id="rId25"/>
   </p:notesMasterIdLst>
   <p:sldIdLst>
     <p:sldId id="256" r:id="rId2"/>
@@ -16,19 +16,21 @@
     <p:sldId id="258" r:id="rId7"/>
     <p:sldId id="266" r:id="rId8"/>
     <p:sldId id="259" r:id="rId9"/>
-    <p:sldId id="260" r:id="rId10"/>
-    <p:sldId id="261" r:id="rId11"/>
-    <p:sldId id="262" r:id="rId12"/>
-    <p:sldId id="263" r:id="rId13"/>
-    <p:sldId id="267" r:id="rId14"/>
-    <p:sldId id="272" r:id="rId15"/>
-    <p:sldId id="273" r:id="rId16"/>
-    <p:sldId id="274" r:id="rId17"/>
-    <p:sldId id="275" r:id="rId18"/>
-    <p:sldId id="276" r:id="rId19"/>
-    <p:sldId id="277" r:id="rId20"/>
-    <p:sldId id="278" r:id="rId21"/>
-    <p:sldId id="279" r:id="rId22"/>
+    <p:sldId id="280" r:id="rId10"/>
+    <p:sldId id="283" r:id="rId11"/>
+    <p:sldId id="267" r:id="rId12"/>
+    <p:sldId id="284" r:id="rId13"/>
+    <p:sldId id="285" r:id="rId14"/>
+    <p:sldId id="287" r:id="rId15"/>
+    <p:sldId id="288" r:id="rId16"/>
+    <p:sldId id="272" r:id="rId17"/>
+    <p:sldId id="273" r:id="rId18"/>
+    <p:sldId id="274" r:id="rId19"/>
+    <p:sldId id="275" r:id="rId20"/>
+    <p:sldId id="276" r:id="rId21"/>
+    <p:sldId id="277" r:id="rId22"/>
+    <p:sldId id="278" r:id="rId23"/>
+    <p:sldId id="279" r:id="rId24"/>
   </p:sldIdLst>
   <p:sldSz cx="12192000" cy="6858000"/>
   <p:notesSz cx="6858000" cy="9144000"/>
@@ -221,7 +223,7 @@
           <a:p>
             <a:fld id="{4D6C1395-F38E-4BBC-A387-C9D21622F6E5}" type="datetimeFigureOut">
               <a:rPr lang="en-US" smtClean="0"/>
-              <a:t>5/25/2017</a:t>
+              <a:t>5/27/2017</a:t>
             </a:fld>
             <a:endParaRPr lang="en-US"/>
           </a:p>
@@ -691,7 +693,7 @@
           <a:p>
             <a:fld id="{DCC5E34C-0BEF-42D1-A3A4-98A0EFA3EE0B}" type="datetime8">
               <a:rPr lang="en-US" smtClean="0"/>
-              <a:t>5/25/2017 9:35 PM</a:t>
+              <a:t>5/27/2017 9:20 AM</a:t>
             </a:fld>
             <a:endParaRPr lang="en-US" dirty="0"/>
           </a:p>
@@ -863,7 +865,7 @@
           <a:p>
             <a:fld id="{4E05C90B-F8EE-4FB7-AEE7-9B0B98AB9CDF}" type="datetimeFigureOut">
               <a:rPr lang="en-US" smtClean="0"/>
-              <a:t>5/25/2017</a:t>
+              <a:t>5/27/2017</a:t>
             </a:fld>
             <a:endParaRPr lang="en-US"/>
           </a:p>
@@ -1031,7 +1033,7 @@
           <a:p>
             <a:fld id="{4E05C90B-F8EE-4FB7-AEE7-9B0B98AB9CDF}" type="datetimeFigureOut">
               <a:rPr lang="en-US" smtClean="0"/>
-              <a:t>5/25/2017</a:t>
+              <a:t>5/27/2017</a:t>
             </a:fld>
             <a:endParaRPr lang="en-US"/>
           </a:p>
@@ -1209,7 +1211,7 @@
           <a:p>
             <a:fld id="{4E05C90B-F8EE-4FB7-AEE7-9B0B98AB9CDF}" type="datetimeFigureOut">
               <a:rPr lang="en-US" smtClean="0"/>
-              <a:t>5/25/2017</a:t>
+              <a:t>5/27/2017</a:t>
             </a:fld>
             <a:endParaRPr lang="en-US"/>
           </a:p>
@@ -1524,7 +1526,7 @@
           <a:p>
             <a:fld id="{4E05C90B-F8EE-4FB7-AEE7-9B0B98AB9CDF}" type="datetimeFigureOut">
               <a:rPr lang="en-US" smtClean="0"/>
-              <a:t>5/25/2017</a:t>
+              <a:t>5/27/2017</a:t>
             </a:fld>
             <a:endParaRPr lang="en-US"/>
           </a:p>
@@ -1769,7 +1771,7 @@
           <a:p>
             <a:fld id="{4E05C90B-F8EE-4FB7-AEE7-9B0B98AB9CDF}" type="datetimeFigureOut">
               <a:rPr lang="en-US" smtClean="0"/>
-              <a:t>5/25/2017</a:t>
+              <a:t>5/27/2017</a:t>
             </a:fld>
             <a:endParaRPr lang="en-US"/>
           </a:p>
@@ -1998,7 +2000,7 @@
           <a:p>
             <a:fld id="{4E05C90B-F8EE-4FB7-AEE7-9B0B98AB9CDF}" type="datetimeFigureOut">
               <a:rPr lang="en-US" smtClean="0"/>
-              <a:t>5/25/2017</a:t>
+              <a:t>5/27/2017</a:t>
             </a:fld>
             <a:endParaRPr lang="en-US"/>
           </a:p>
@@ -2362,7 +2364,7 @@
           <a:p>
             <a:fld id="{4E05C90B-F8EE-4FB7-AEE7-9B0B98AB9CDF}" type="datetimeFigureOut">
               <a:rPr lang="en-US" smtClean="0"/>
-              <a:t>5/25/2017</a:t>
+              <a:t>5/27/2017</a:t>
             </a:fld>
             <a:endParaRPr lang="en-US"/>
           </a:p>
@@ -2479,7 +2481,7 @@
           <a:p>
             <a:fld id="{4E05C90B-F8EE-4FB7-AEE7-9B0B98AB9CDF}" type="datetimeFigureOut">
               <a:rPr lang="en-US" smtClean="0"/>
-              <a:t>5/25/2017</a:t>
+              <a:t>5/27/2017</a:t>
             </a:fld>
             <a:endParaRPr lang="en-US"/>
           </a:p>
@@ -2574,7 +2576,7 @@
           <a:p>
             <a:fld id="{4E05C90B-F8EE-4FB7-AEE7-9B0B98AB9CDF}" type="datetimeFigureOut">
               <a:rPr lang="en-US" smtClean="0"/>
-              <a:t>5/25/2017</a:t>
+              <a:t>5/27/2017</a:t>
             </a:fld>
             <a:endParaRPr lang="en-US"/>
           </a:p>
@@ -2849,7 +2851,7 @@
           <a:p>
             <a:fld id="{4E05C90B-F8EE-4FB7-AEE7-9B0B98AB9CDF}" type="datetimeFigureOut">
               <a:rPr lang="en-US" smtClean="0"/>
-              <a:t>5/25/2017</a:t>
+              <a:t>5/27/2017</a:t>
             </a:fld>
             <a:endParaRPr lang="en-US"/>
           </a:p>
@@ -3101,7 +3103,7 @@
           <a:p>
             <a:fld id="{4E05C90B-F8EE-4FB7-AEE7-9B0B98AB9CDF}" type="datetimeFigureOut">
               <a:rPr lang="en-US" smtClean="0"/>
-              <a:t>5/25/2017</a:t>
+              <a:t>5/27/2017</a:t>
             </a:fld>
             <a:endParaRPr lang="en-US"/>
           </a:p>
@@ -3312,7 +3314,7 @@
           <a:p>
             <a:fld id="{4E05C90B-F8EE-4FB7-AEE7-9B0B98AB9CDF}" type="datetimeFigureOut">
               <a:rPr lang="en-US" smtClean="0"/>
-              <a:t>5/25/2017</a:t>
+              <a:t>5/27/2017</a:t>
             </a:fld>
             <a:endParaRPr lang="en-US"/>
           </a:p>
@@ -3810,53 +3812,29 @@
       </p:grpSpPr>
       <p:sp>
         <p:nvSpPr>
-          <p:cNvPr id="2" name="Title 1"/>
-          <p:cNvSpPr>
-            <a:spLocks noGrp="1"/>
-          </p:cNvSpPr>
-          <p:nvPr>
-            <p:ph type="title"/>
-          </p:nvPr>
+          <p:cNvPr id="2" name="TextBox 1"/>
+          <p:cNvSpPr txBox="1"/>
+          <p:nvPr/>
         </p:nvSpPr>
-        <p:spPr/>
+        <p:spPr>
+          <a:xfrm>
+            <a:off x="4922520" y="3058160"/>
+            <a:ext cx="1805302" cy="1015663"/>
+          </a:xfrm>
+          <a:prstGeom prst="rect">
+            <a:avLst/>
+          </a:prstGeom>
+          <a:noFill/>
+        </p:spPr>
         <p:txBody>
-          <a:bodyPr/>
+          <a:bodyPr wrap="none" rtlCol="0">
+            <a:spAutoFit/>
+          </a:bodyPr>
           <a:lstStyle/>
           <a:p>
             <a:r>
-              <a:rPr lang="en-US" dirty="0"/>
-              <a:t>Environment modeling</a:t>
-            </a:r>
-          </a:p>
-        </p:txBody>
-      </p:sp>
-      <p:sp>
-        <p:nvSpPr>
-          <p:cNvPr id="3" name="Content Placeholder 2"/>
-          <p:cNvSpPr>
-            <a:spLocks noGrp="1"/>
-          </p:cNvSpPr>
-          <p:nvPr>
-            <p:ph idx="1"/>
-          </p:nvPr>
-        </p:nvSpPr>
-        <p:spPr/>
-        <p:txBody>
-          <a:bodyPr/>
-          <a:lstStyle/>
-          <a:p>
-            <a:r>
-              <a:rPr lang="en-US" dirty="0"/>
-              <a:t>Foreign function interface</a:t>
-            </a:r>
-          </a:p>
-          <a:p>
-            <a:endParaRPr lang="en-US" dirty="0"/>
-          </a:p>
-          <a:p>
-            <a:r>
-              <a:rPr lang="en-US" dirty="0"/>
-              <a:t>Modeling failures using events</a:t>
+              <a:rPr lang="en-US" sz="6000" dirty="0"/>
+              <a:t>Hello</a:t>
             </a:r>
           </a:p>
         </p:txBody>
@@ -3864,7 +3842,7 @@
     </p:spTree>
     <p:extLst>
       <p:ext uri="{BB962C8B-B14F-4D97-AF65-F5344CB8AC3E}">
-        <p14:creationId xmlns:p14="http://schemas.microsoft.com/office/powerpoint/2010/main" val="2455387089"/>
+        <p14:creationId xmlns:p14="http://schemas.microsoft.com/office/powerpoint/2010/main" val="1629686468"/>
       </p:ext>
     </p:extLst>
   </p:cSld>
@@ -3903,172 +3881,6 @@
         </p:nvSpPr>
         <p:spPr/>
         <p:txBody>
-          <a:bodyPr/>
-          <a:lstStyle/>
-          <a:p>
-            <a:r>
-              <a:rPr lang="en-US" dirty="0"/>
-              <a:t>Unit interaction tests</a:t>
-            </a:r>
-          </a:p>
-        </p:txBody>
-      </p:sp>
-      <p:sp>
-        <p:nvSpPr>
-          <p:cNvPr id="3" name="Content Placeholder 2"/>
-          <p:cNvSpPr>
-            <a:spLocks noGrp="1"/>
-          </p:cNvSpPr>
-          <p:nvPr>
-            <p:ph idx="1"/>
-          </p:nvPr>
-        </p:nvSpPr>
-        <p:spPr/>
-        <p:txBody>
-          <a:bodyPr/>
-          <a:lstStyle/>
-          <a:p>
-            <a:r>
-              <a:rPr lang="en-US" dirty="0"/>
-              <a:t>Module constructors</a:t>
-            </a:r>
-          </a:p>
-          <a:p>
-            <a:r>
-              <a:rPr lang="en-US" dirty="0"/>
-              <a:t>Test declarations</a:t>
-            </a:r>
-          </a:p>
-        </p:txBody>
-      </p:sp>
-    </p:spTree>
-    <p:extLst>
-      <p:ext uri="{BB962C8B-B14F-4D97-AF65-F5344CB8AC3E}">
-        <p14:creationId xmlns:p14="http://schemas.microsoft.com/office/powerpoint/2010/main" val="628802943"/>
-      </p:ext>
-    </p:extLst>
-  </p:cSld>
-  <p:clrMapOvr>
-    <a:masterClrMapping/>
-  </p:clrMapOvr>
-</p:sld>
-</file>
-
-<file path=ppt/slides/slide12.xml><?xml version="1.0" encoding="utf-8"?>
-<p:sld xmlns:a="http://schemas.openxmlformats.org/drawingml/2006/main" xmlns:r="http://schemas.openxmlformats.org/officeDocument/2006/relationships" xmlns:p="http://schemas.openxmlformats.org/presentationml/2006/main">
-  <p:cSld>
-    <p:spTree>
-      <p:nvGrpSpPr>
-        <p:cNvPr id="1" name=""/>
-        <p:cNvGrpSpPr/>
-        <p:nvPr/>
-      </p:nvGrpSpPr>
-      <p:grpSpPr>
-        <a:xfrm>
-          <a:off x="0" y="0"/>
-          <a:ext cx="0" cy="0"/>
-          <a:chOff x="0" y="0"/>
-          <a:chExt cx="0" cy="0"/>
-        </a:xfrm>
-      </p:grpSpPr>
-      <p:sp>
-        <p:nvSpPr>
-          <p:cNvPr id="2" name="Title 1"/>
-          <p:cNvSpPr>
-            <a:spLocks noGrp="1"/>
-          </p:cNvSpPr>
-          <p:nvPr>
-            <p:ph type="title"/>
-          </p:nvPr>
-        </p:nvSpPr>
-        <p:spPr/>
-        <p:txBody>
-          <a:bodyPr/>
-          <a:lstStyle/>
-          <a:p>
-            <a:r>
-              <a:rPr lang="en-US" dirty="0"/>
-              <a:t>Advanced language features</a:t>
-            </a:r>
-          </a:p>
-        </p:txBody>
-      </p:sp>
-      <p:sp>
-        <p:nvSpPr>
-          <p:cNvPr id="3" name="Content Placeholder 2"/>
-          <p:cNvSpPr>
-            <a:spLocks noGrp="1"/>
-          </p:cNvSpPr>
-          <p:nvPr>
-            <p:ph idx="1"/>
-          </p:nvPr>
-        </p:nvSpPr>
-        <p:spPr/>
-        <p:txBody>
-          <a:bodyPr/>
-          <a:lstStyle/>
-          <a:p>
-            <a:r>
-              <a:rPr lang="en-US" dirty="0"/>
-              <a:t>Memory management</a:t>
-            </a:r>
-          </a:p>
-          <a:p>
-            <a:r>
-              <a:rPr lang="en-US" dirty="0"/>
-              <a:t>Data-race freedom</a:t>
-            </a:r>
-          </a:p>
-          <a:p>
-            <a:endParaRPr lang="en-US" dirty="0"/>
-          </a:p>
-          <a:p>
-            <a:endParaRPr lang="en-US" dirty="0"/>
-          </a:p>
-        </p:txBody>
-      </p:sp>
-    </p:spTree>
-    <p:extLst>
-      <p:ext uri="{BB962C8B-B14F-4D97-AF65-F5344CB8AC3E}">
-        <p14:creationId xmlns:p14="http://schemas.microsoft.com/office/powerpoint/2010/main" val="3168878971"/>
-      </p:ext>
-    </p:extLst>
-  </p:cSld>
-  <p:clrMapOvr>
-    <a:masterClrMapping/>
-  </p:clrMapOvr>
-</p:sld>
-</file>
-
-<file path=ppt/slides/slide13.xml><?xml version="1.0" encoding="utf-8"?>
-<p:sld xmlns:a="http://schemas.openxmlformats.org/drawingml/2006/main" xmlns:r="http://schemas.openxmlformats.org/officeDocument/2006/relationships" xmlns:p="http://schemas.openxmlformats.org/presentationml/2006/main">
-  <p:cSld>
-    <p:spTree>
-      <p:nvGrpSpPr>
-        <p:cNvPr id="1" name=""/>
-        <p:cNvGrpSpPr/>
-        <p:nvPr/>
-      </p:nvGrpSpPr>
-      <p:grpSpPr>
-        <a:xfrm>
-          <a:off x="0" y="0"/>
-          <a:ext cx="0" cy="0"/>
-          <a:chOff x="0" y="0"/>
-          <a:chExt cx="0" cy="0"/>
-        </a:xfrm>
-      </p:grpSpPr>
-      <p:sp>
-        <p:nvSpPr>
-          <p:cNvPr id="2" name="Title 1"/>
-          <p:cNvSpPr>
-            <a:spLocks noGrp="1"/>
-          </p:cNvSpPr>
-          <p:nvPr>
-            <p:ph type="title"/>
-          </p:nvPr>
-        </p:nvSpPr>
-        <p:spPr/>
-        <p:txBody>
           <a:bodyPr>
             <a:noAutofit/>
           </a:bodyPr>
@@ -4076,7 +3888,7 @@
           <a:p>
             <a:r>
               <a:rPr lang="en-US" sz="4000" dirty="0"/>
-              <a:t>Systematic testing as a search problem</a:t>
+              <a:t>Asynchronous system as a state-transition graph</a:t>
             </a:r>
           </a:p>
         </p:txBody>
@@ -6579,6 +6391,179 @@
 </p:sld>
 </file>
 
+<file path=ppt/slides/slide12.xml><?xml version="1.0" encoding="utf-8"?>
+<p:sld xmlns:a="http://schemas.openxmlformats.org/drawingml/2006/main" xmlns:r="http://schemas.openxmlformats.org/officeDocument/2006/relationships" xmlns:p="http://schemas.openxmlformats.org/presentationml/2006/main">
+  <p:cSld>
+    <p:spTree>
+      <p:nvGrpSpPr>
+        <p:cNvPr id="1" name=""/>
+        <p:cNvGrpSpPr/>
+        <p:nvPr/>
+      </p:nvGrpSpPr>
+      <p:grpSpPr>
+        <a:xfrm>
+          <a:off x="0" y="0"/>
+          <a:ext cx="0" cy="0"/>
+          <a:chOff x="0" y="0"/>
+          <a:chExt cx="0" cy="0"/>
+        </a:xfrm>
+      </p:grpSpPr>
+      <p:sp>
+        <p:nvSpPr>
+          <p:cNvPr id="2" name="Title 1"/>
+          <p:cNvSpPr>
+            <a:spLocks noGrp="1"/>
+          </p:cNvSpPr>
+          <p:nvPr>
+            <p:ph type="title"/>
+          </p:nvPr>
+        </p:nvSpPr>
+        <p:spPr/>
+        <p:txBody>
+          <a:bodyPr/>
+          <a:lstStyle/>
+          <a:p>
+            <a:r>
+              <a:rPr lang="en-US" dirty="0"/>
+              <a:t>Safety specifications</a:t>
+            </a:r>
+          </a:p>
+        </p:txBody>
+      </p:sp>
+      <p:sp>
+        <p:nvSpPr>
+          <p:cNvPr id="3" name="Content Placeholder 2"/>
+          <p:cNvSpPr>
+            <a:spLocks noGrp="1"/>
+          </p:cNvSpPr>
+          <p:nvPr>
+            <p:ph idx="1"/>
+          </p:nvPr>
+        </p:nvSpPr>
+        <p:spPr/>
+        <p:txBody>
+          <a:bodyPr/>
+          <a:lstStyle/>
+          <a:p>
+            <a:r>
+              <a:rPr lang="en-US" dirty="0"/>
+              <a:t>Generalizes assertion in sequential programs</a:t>
+            </a:r>
+          </a:p>
+          <a:p>
+            <a:endParaRPr lang="en-US" dirty="0"/>
+          </a:p>
+          <a:p>
+            <a:r>
+              <a:rPr lang="en-US" dirty="0"/>
+              <a:t>Violation is a finite execution</a:t>
+            </a:r>
+          </a:p>
+          <a:p>
+            <a:endParaRPr lang="en-US" dirty="0"/>
+          </a:p>
+          <a:p>
+            <a:r>
+              <a:rPr lang="en-US" dirty="0"/>
+              <a:t>Categories</a:t>
+            </a:r>
+          </a:p>
+          <a:p>
+            <a:pPr lvl="1"/>
+            <a:r>
+              <a:rPr lang="en-US" dirty="0"/>
+              <a:t>Assertion</a:t>
+            </a:r>
+          </a:p>
+          <a:p>
+            <a:pPr lvl="1"/>
+            <a:r>
+              <a:rPr lang="en-US" dirty="0"/>
+              <a:t>Unhandled event</a:t>
+            </a:r>
+          </a:p>
+          <a:p>
+            <a:pPr lvl="1"/>
+            <a:r>
+              <a:rPr lang="en-US" dirty="0"/>
+              <a:t>Monitor</a:t>
+            </a:r>
+          </a:p>
+        </p:txBody>
+      </p:sp>
+    </p:spTree>
+    <p:extLst>
+      <p:ext uri="{BB962C8B-B14F-4D97-AF65-F5344CB8AC3E}">
+        <p14:creationId xmlns:p14="http://schemas.microsoft.com/office/powerpoint/2010/main" val="1446004434"/>
+      </p:ext>
+    </p:extLst>
+  </p:cSld>
+  <p:clrMapOvr>
+    <a:masterClrMapping/>
+  </p:clrMapOvr>
+</p:sld>
+</file>
+
+<file path=ppt/slides/slide13.xml><?xml version="1.0" encoding="utf-8"?>
+<p:sld xmlns:a="http://schemas.openxmlformats.org/drawingml/2006/main" xmlns:r="http://schemas.openxmlformats.org/officeDocument/2006/relationships" xmlns:p="http://schemas.openxmlformats.org/presentationml/2006/main">
+  <p:cSld>
+    <p:spTree>
+      <p:nvGrpSpPr>
+        <p:cNvPr id="1" name=""/>
+        <p:cNvGrpSpPr/>
+        <p:nvPr/>
+      </p:nvGrpSpPr>
+      <p:grpSpPr>
+        <a:xfrm>
+          <a:off x="0" y="0"/>
+          <a:ext cx="0" cy="0"/>
+          <a:chOff x="0" y="0"/>
+          <a:chExt cx="0" cy="0"/>
+        </a:xfrm>
+      </p:grpSpPr>
+      <p:sp>
+        <p:nvSpPr>
+          <p:cNvPr id="2" name="TextBox 1"/>
+          <p:cNvSpPr txBox="1"/>
+          <p:nvPr/>
+        </p:nvSpPr>
+        <p:spPr>
+          <a:xfrm>
+            <a:off x="4922520" y="3058160"/>
+            <a:ext cx="3078728" cy="1015663"/>
+          </a:xfrm>
+          <a:prstGeom prst="rect">
+            <a:avLst/>
+          </a:prstGeom>
+          <a:noFill/>
+        </p:spPr>
+        <p:txBody>
+          <a:bodyPr wrap="none" rtlCol="0">
+            <a:spAutoFit/>
+          </a:bodyPr>
+          <a:lstStyle/>
+          <a:p>
+            <a:r>
+              <a:rPr lang="en-US" sz="6000" dirty="0" err="1"/>
+              <a:t>PingPong</a:t>
+            </a:r>
+            <a:endParaRPr lang="en-US" sz="6000" dirty="0"/>
+          </a:p>
+        </p:txBody>
+      </p:sp>
+    </p:spTree>
+    <p:extLst>
+      <p:ext uri="{BB962C8B-B14F-4D97-AF65-F5344CB8AC3E}">
+        <p14:creationId xmlns:p14="http://schemas.microsoft.com/office/powerpoint/2010/main" val="4040758676"/>
+      </p:ext>
+    </p:extLst>
+  </p:cSld>
+  <p:clrMapOvr>
+    <a:masterClrMapping/>
+  </p:clrMapOvr>
+</p:sld>
+</file>
+
 <file path=ppt/slides/slide14.xml><?xml version="1.0" encoding="utf-8"?>
 <p:sld xmlns:a="http://schemas.openxmlformats.org/drawingml/2006/main" xmlns:r="http://schemas.openxmlformats.org/officeDocument/2006/relationships" xmlns:p="http://schemas.openxmlformats.org/presentationml/2006/main">
   <p:cSld>
@@ -6613,6 +6598,173 @@
           <a:p>
             <a:r>
               <a:rPr lang="en-US" dirty="0"/>
+              <a:t>Liveness specifications</a:t>
+            </a:r>
+          </a:p>
+        </p:txBody>
+      </p:sp>
+      <p:sp>
+        <p:nvSpPr>
+          <p:cNvPr id="3" name="Content Placeholder 2"/>
+          <p:cNvSpPr>
+            <a:spLocks noGrp="1"/>
+          </p:cNvSpPr>
+          <p:nvPr>
+            <p:ph idx="1"/>
+          </p:nvPr>
+        </p:nvSpPr>
+        <p:spPr/>
+        <p:txBody>
+          <a:bodyPr/>
+          <a:lstStyle/>
+          <a:p>
+            <a:r>
+              <a:rPr lang="en-US" dirty="0"/>
+              <a:t>Generalizes termination in sequential programs</a:t>
+            </a:r>
+          </a:p>
+          <a:p>
+            <a:endParaRPr lang="en-US" dirty="0"/>
+          </a:p>
+          <a:p>
+            <a:r>
+              <a:rPr lang="en-US" dirty="0"/>
+              <a:t>Violation is an infinite execution</a:t>
+            </a:r>
+          </a:p>
+          <a:p>
+            <a:endParaRPr lang="en-US" dirty="0"/>
+          </a:p>
+          <a:p>
+            <a:r>
+              <a:rPr lang="en-US" dirty="0"/>
+              <a:t>Safety -&gt; Bad never happens</a:t>
+            </a:r>
+          </a:p>
+          <a:p>
+            <a:r>
+              <a:rPr lang="en-US" dirty="0"/>
+              <a:t>Liveness -&gt; Good eventually happens</a:t>
+            </a:r>
+          </a:p>
+          <a:p>
+            <a:endParaRPr lang="en-US" dirty="0"/>
+          </a:p>
+          <a:p>
+            <a:r>
+              <a:rPr lang="en-US" dirty="0"/>
+              <a:t>Encode “Good” using liveness monitor</a:t>
+            </a:r>
+          </a:p>
+        </p:txBody>
+      </p:sp>
+    </p:spTree>
+    <p:extLst>
+      <p:ext uri="{BB962C8B-B14F-4D97-AF65-F5344CB8AC3E}">
+        <p14:creationId xmlns:p14="http://schemas.microsoft.com/office/powerpoint/2010/main" val="1649541553"/>
+      </p:ext>
+    </p:extLst>
+  </p:cSld>
+  <p:clrMapOvr>
+    <a:masterClrMapping/>
+  </p:clrMapOvr>
+</p:sld>
+</file>
+
+<file path=ppt/slides/slide15.xml><?xml version="1.0" encoding="utf-8"?>
+<p:sld xmlns:a="http://schemas.openxmlformats.org/drawingml/2006/main" xmlns:r="http://schemas.openxmlformats.org/officeDocument/2006/relationships" xmlns:p="http://schemas.openxmlformats.org/presentationml/2006/main">
+  <p:cSld>
+    <p:spTree>
+      <p:nvGrpSpPr>
+        <p:cNvPr id="1" name=""/>
+        <p:cNvGrpSpPr/>
+        <p:nvPr/>
+      </p:nvGrpSpPr>
+      <p:grpSpPr>
+        <a:xfrm>
+          <a:off x="0" y="0"/>
+          <a:ext cx="0" cy="0"/>
+          <a:chOff x="0" y="0"/>
+          <a:chExt cx="0" cy="0"/>
+        </a:xfrm>
+      </p:grpSpPr>
+      <p:sp>
+        <p:nvSpPr>
+          <p:cNvPr id="2" name="TextBox 1"/>
+          <p:cNvSpPr txBox="1"/>
+          <p:nvPr/>
+        </p:nvSpPr>
+        <p:spPr>
+          <a:xfrm>
+            <a:off x="4922520" y="3058160"/>
+            <a:ext cx="3078728" cy="1015663"/>
+          </a:xfrm>
+          <a:prstGeom prst="rect">
+            <a:avLst/>
+          </a:prstGeom>
+          <a:noFill/>
+        </p:spPr>
+        <p:txBody>
+          <a:bodyPr wrap="none" rtlCol="0">
+            <a:spAutoFit/>
+          </a:bodyPr>
+          <a:lstStyle/>
+          <a:p>
+            <a:r>
+              <a:rPr lang="en-US" sz="6000" dirty="0" err="1"/>
+              <a:t>PingPong</a:t>
+            </a:r>
+            <a:endParaRPr lang="en-US" sz="6000" dirty="0"/>
+          </a:p>
+        </p:txBody>
+      </p:sp>
+    </p:spTree>
+    <p:extLst>
+      <p:ext uri="{BB962C8B-B14F-4D97-AF65-F5344CB8AC3E}">
+        <p14:creationId xmlns:p14="http://schemas.microsoft.com/office/powerpoint/2010/main" val="190483553"/>
+      </p:ext>
+    </p:extLst>
+  </p:cSld>
+  <p:clrMapOvr>
+    <a:masterClrMapping/>
+  </p:clrMapOvr>
+</p:sld>
+</file>
+
+<file path=ppt/slides/slide16.xml><?xml version="1.0" encoding="utf-8"?>
+<p:sld xmlns:a="http://schemas.openxmlformats.org/drawingml/2006/main" xmlns:r="http://schemas.openxmlformats.org/officeDocument/2006/relationships" xmlns:p="http://schemas.openxmlformats.org/presentationml/2006/main">
+  <p:cSld>
+    <p:spTree>
+      <p:nvGrpSpPr>
+        <p:cNvPr id="1" name=""/>
+        <p:cNvGrpSpPr/>
+        <p:nvPr/>
+      </p:nvGrpSpPr>
+      <p:grpSpPr>
+        <a:xfrm>
+          <a:off x="0" y="0"/>
+          <a:ext cx="0" cy="0"/>
+          <a:chOff x="0" y="0"/>
+          <a:chExt cx="0" cy="0"/>
+        </a:xfrm>
+      </p:grpSpPr>
+      <p:sp>
+        <p:nvSpPr>
+          <p:cNvPr id="2" name="Title 1"/>
+          <p:cNvSpPr>
+            <a:spLocks noGrp="1"/>
+          </p:cNvSpPr>
+          <p:nvPr>
+            <p:ph type="title"/>
+          </p:nvPr>
+        </p:nvSpPr>
+        <p:spPr/>
+        <p:txBody>
+          <a:bodyPr/>
+          <a:lstStyle/>
+          <a:p>
+            <a:r>
+              <a:rPr lang="en-US" dirty="0"/>
               <a:t>Writing P# programs</a:t>
             </a:r>
           </a:p>
@@ -6710,7 +6862,7 @@
 </p:sld>
 </file>
 
-<file path=ppt/slides/slide15.xml><?xml version="1.0" encoding="utf-8"?>
+<file path=ppt/slides/slide17.xml><?xml version="1.0" encoding="utf-8"?>
 <p:sld xmlns:a="http://schemas.openxmlformats.org/drawingml/2006/main" xmlns:r="http://schemas.openxmlformats.org/officeDocument/2006/relationships" xmlns:p="http://schemas.openxmlformats.org/presentationml/2006/main">
   <p:cSld>
     <p:spTree>
@@ -6784,6 +6936,52 @@
                 </a:solidFill>
                 <a:latin typeface="Consolas" panose="020B0609020204030204" pitchFamily="49" charset="0"/>
               </a:rPr>
+              <a:t>event</a:t>
+            </a:r>
+            <a:r>
+              <a:rPr lang="en-GB" sz="900" dirty="0">
+                <a:solidFill>
+                  <a:srgbClr val="000000"/>
+                </a:solidFill>
+                <a:latin typeface="Consolas" panose="020B0609020204030204" pitchFamily="49" charset="0"/>
+              </a:rPr>
+              <a:t> </a:t>
+            </a:r>
+            <a:r>
+              <a:rPr lang="en-GB" sz="900" dirty="0">
+                <a:solidFill>
+                  <a:srgbClr val="2B91AF"/>
+                </a:solidFill>
+                <a:latin typeface="Consolas" panose="020B0609020204030204" pitchFamily="49" charset="0"/>
+              </a:rPr>
+              <a:t>Pong</a:t>
+            </a:r>
+            <a:r>
+              <a:rPr lang="en-GB" sz="900" dirty="0">
+                <a:solidFill>
+                  <a:srgbClr val="000000"/>
+                </a:solidFill>
+                <a:latin typeface="Consolas" panose="020B0609020204030204" pitchFamily="49" charset="0"/>
+              </a:rPr>
+              <a:t>;</a:t>
+            </a:r>
+          </a:p>
+          <a:p>
+            <a:endParaRPr lang="en-GB" sz="900" dirty="0">
+              <a:solidFill>
+                <a:srgbClr val="0000FF"/>
+              </a:solidFill>
+              <a:latin typeface="Consolas" panose="020B0609020204030204" pitchFamily="49" charset="0"/>
+            </a:endParaRPr>
+          </a:p>
+          <a:p>
+            <a:r>
+              <a:rPr lang="en-GB" sz="900" dirty="0">
+                <a:solidFill>
+                  <a:srgbClr val="0000FF"/>
+                </a:solidFill>
+                <a:latin typeface="Consolas" panose="020B0609020204030204" pitchFamily="49" charset="0"/>
+              </a:rPr>
               <a:t>machine</a:t>
             </a:r>
             <a:r>
@@ -6821,61 +7019,6 @@
               </a:rPr>
               <a:t>{</a:t>
             </a:r>
-          </a:p>
-          <a:p>
-            <a:r>
-              <a:rPr lang="en-GB" sz="900" dirty="0">
-                <a:solidFill>
-                  <a:srgbClr val="000000"/>
-                </a:solidFill>
-                <a:latin typeface="Consolas" panose="020B0609020204030204" pitchFamily="49" charset="0"/>
-              </a:rPr>
-              <a:t>    </a:t>
-            </a:r>
-            <a:r>
-              <a:rPr lang="en-GB" sz="900" dirty="0">
-                <a:solidFill>
-                  <a:srgbClr val="0000FF"/>
-                </a:solidFill>
-                <a:latin typeface="Consolas" panose="020B0609020204030204" pitchFamily="49" charset="0"/>
-              </a:rPr>
-              <a:t>event</a:t>
-            </a:r>
-            <a:r>
-              <a:rPr lang="en-GB" sz="900" dirty="0">
-                <a:solidFill>
-                  <a:srgbClr val="000000"/>
-                </a:solidFill>
-                <a:latin typeface="Consolas" panose="020B0609020204030204" pitchFamily="49" charset="0"/>
-              </a:rPr>
-              <a:t> </a:t>
-            </a:r>
-            <a:r>
-              <a:rPr lang="en-GB" sz="900" dirty="0">
-                <a:solidFill>
-                  <a:srgbClr val="2B91AF"/>
-                </a:solidFill>
-                <a:latin typeface="Consolas" panose="020B0609020204030204" pitchFamily="49" charset="0"/>
-              </a:rPr>
-              <a:t>Pong</a:t>
-            </a:r>
-            <a:r>
-              <a:rPr lang="en-GB" sz="900" dirty="0">
-                <a:solidFill>
-                  <a:srgbClr val="000000"/>
-                </a:solidFill>
-                <a:latin typeface="Consolas" panose="020B0609020204030204" pitchFamily="49" charset="0"/>
-              </a:rPr>
-              <a:t>;</a:t>
-            </a:r>
-          </a:p>
-          <a:p>
-            <a:endParaRPr lang="en-GB" sz="900" dirty="0">
-              <a:solidFill>
-                <a:srgbClr val="000000"/>
-              </a:solidFill>
-              <a:latin typeface="Consolas" panose="020B0609020204030204" pitchFamily="49" charset="0"/>
-            </a:endParaRPr>
           </a:p>
           <a:p>
             <a:r>
@@ -6966,25 +7109,7 @@
                 </a:solidFill>
                 <a:latin typeface="Consolas" panose="020B0609020204030204" pitchFamily="49" charset="0"/>
               </a:rPr>
-              <a:t> </a:t>
-            </a:r>
-            <a:r>
-              <a:rPr lang="en-GB" sz="900" dirty="0" err="1">
-                <a:solidFill>
-                  <a:srgbClr val="000000"/>
-                </a:solidFill>
-                <a:latin typeface="Consolas" panose="020B0609020204030204" pitchFamily="49" charset="0"/>
-              </a:rPr>
-              <a:t>Client.Ping</a:t>
-            </a:r>
-            <a:r>
-              <a:rPr lang="en-GB" sz="900" dirty="0">
-                <a:solidFill>
-                  <a:srgbClr val="000000"/>
-                </a:solidFill>
-                <a:latin typeface="Consolas" panose="020B0609020204030204" pitchFamily="49" charset="0"/>
-              </a:rPr>
-              <a:t> </a:t>
+              <a:t> Ping </a:t>
             </a:r>
             <a:r>
               <a:rPr lang="en-GB" sz="900" dirty="0">
@@ -7144,25 +7269,7 @@
                 </a:solidFill>
                 <a:latin typeface="Consolas" panose="020B0609020204030204" pitchFamily="49" charset="0"/>
               </a:rPr>
-              <a:t> </a:t>
-            </a:r>
-            <a:r>
-              <a:rPr lang="en-GB" sz="900" dirty="0" err="1">
-                <a:solidFill>
-                  <a:srgbClr val="000000"/>
-                </a:solidFill>
-                <a:latin typeface="Consolas" panose="020B0609020204030204" pitchFamily="49" charset="0"/>
-              </a:rPr>
-              <a:t>Client.Ping</a:t>
-            </a:r>
-            <a:r>
-              <a:rPr lang="en-GB" sz="900" dirty="0">
-                <a:solidFill>
-                  <a:srgbClr val="000000"/>
-                </a:solidFill>
-                <a:latin typeface="Consolas" panose="020B0609020204030204" pitchFamily="49" charset="0"/>
-              </a:rPr>
-              <a:t>).client;</a:t>
+              <a:t> Ping).client;</a:t>
             </a:r>
           </a:p>
           <a:p>
@@ -7247,6 +7354,164 @@
                 </a:solidFill>
                 <a:latin typeface="Consolas" panose="020B0609020204030204" pitchFamily="49" charset="0"/>
               </a:rPr>
+              <a:t>event</a:t>
+            </a:r>
+            <a:r>
+              <a:rPr lang="en-GB" sz="900" dirty="0">
+                <a:solidFill>
+                  <a:srgbClr val="000000"/>
+                </a:solidFill>
+                <a:latin typeface="Consolas" panose="020B0609020204030204" pitchFamily="49" charset="0"/>
+              </a:rPr>
+              <a:t> </a:t>
+            </a:r>
+            <a:r>
+              <a:rPr lang="en-GB" sz="900" dirty="0">
+                <a:solidFill>
+                  <a:srgbClr val="2B91AF"/>
+                </a:solidFill>
+                <a:latin typeface="Consolas" panose="020B0609020204030204" pitchFamily="49" charset="0"/>
+              </a:rPr>
+              <a:t>Config</a:t>
+            </a:r>
+            <a:r>
+              <a:rPr lang="en-GB" sz="900" dirty="0">
+                <a:solidFill>
+                  <a:srgbClr val="000000"/>
+                </a:solidFill>
+                <a:latin typeface="Consolas" panose="020B0609020204030204" pitchFamily="49" charset="0"/>
+              </a:rPr>
+              <a:t> (server: </a:t>
+            </a:r>
+            <a:r>
+              <a:rPr lang="en-GB" sz="900" dirty="0">
+                <a:solidFill>
+                  <a:srgbClr val="0000FF"/>
+                </a:solidFill>
+                <a:latin typeface="Consolas" panose="020B0609020204030204" pitchFamily="49" charset="0"/>
+              </a:rPr>
+              <a:t>machine</a:t>
+            </a:r>
+            <a:r>
+              <a:rPr lang="en-GB" sz="900" dirty="0">
+                <a:solidFill>
+                  <a:srgbClr val="000000"/>
+                </a:solidFill>
+                <a:latin typeface="Consolas" panose="020B0609020204030204" pitchFamily="49" charset="0"/>
+              </a:rPr>
+              <a:t>);</a:t>
+            </a:r>
+          </a:p>
+          <a:p>
+            <a:r>
+              <a:rPr lang="en-GB" sz="900" dirty="0">
+                <a:solidFill>
+                  <a:srgbClr val="0000FF"/>
+                </a:solidFill>
+                <a:latin typeface="Consolas" panose="020B0609020204030204" pitchFamily="49" charset="0"/>
+              </a:rPr>
+              <a:t>event</a:t>
+            </a:r>
+            <a:r>
+              <a:rPr lang="en-GB" sz="900" dirty="0">
+                <a:solidFill>
+                  <a:srgbClr val="000000"/>
+                </a:solidFill>
+                <a:latin typeface="Consolas" panose="020B0609020204030204" pitchFamily="49" charset="0"/>
+              </a:rPr>
+              <a:t> </a:t>
+            </a:r>
+            <a:r>
+              <a:rPr lang="en-GB" sz="900" dirty="0">
+                <a:solidFill>
+                  <a:srgbClr val="2B91AF"/>
+                </a:solidFill>
+                <a:latin typeface="Consolas" panose="020B0609020204030204" pitchFamily="49" charset="0"/>
+              </a:rPr>
+              <a:t>Unit</a:t>
+            </a:r>
+            <a:r>
+              <a:rPr lang="en-GB" sz="900" dirty="0">
+                <a:solidFill>
+                  <a:srgbClr val="000000"/>
+                </a:solidFill>
+                <a:latin typeface="Consolas" panose="020B0609020204030204" pitchFamily="49" charset="0"/>
+              </a:rPr>
+              <a:t>;</a:t>
+            </a:r>
+          </a:p>
+          <a:p>
+            <a:r>
+              <a:rPr lang="en-GB" sz="900" dirty="0">
+                <a:solidFill>
+                  <a:srgbClr val="0000FF"/>
+                </a:solidFill>
+                <a:latin typeface="Consolas" panose="020B0609020204030204" pitchFamily="49" charset="0"/>
+              </a:rPr>
+              <a:t>event</a:t>
+            </a:r>
+            <a:r>
+              <a:rPr lang="en-GB" sz="900" dirty="0">
+                <a:solidFill>
+                  <a:srgbClr val="000000"/>
+                </a:solidFill>
+                <a:latin typeface="Consolas" panose="020B0609020204030204" pitchFamily="49" charset="0"/>
+              </a:rPr>
+              <a:t> </a:t>
+            </a:r>
+            <a:r>
+              <a:rPr lang="en-GB" sz="900" dirty="0">
+                <a:solidFill>
+                  <a:srgbClr val="2B91AF"/>
+                </a:solidFill>
+                <a:latin typeface="Consolas" panose="020B0609020204030204" pitchFamily="49" charset="0"/>
+              </a:rPr>
+              <a:t>Ping</a:t>
+            </a:r>
+            <a:r>
+              <a:rPr lang="en-GB" sz="900" dirty="0">
+                <a:solidFill>
+                  <a:srgbClr val="000000"/>
+                </a:solidFill>
+                <a:latin typeface="Consolas" panose="020B0609020204030204" pitchFamily="49" charset="0"/>
+              </a:rPr>
+              <a:t> (client: </a:t>
+            </a:r>
+            <a:r>
+              <a:rPr lang="en-GB" sz="900" dirty="0">
+                <a:solidFill>
+                  <a:srgbClr val="0000FF"/>
+                </a:solidFill>
+                <a:latin typeface="Consolas" panose="020B0609020204030204" pitchFamily="49" charset="0"/>
+              </a:rPr>
+              <a:t>machine</a:t>
+            </a:r>
+            <a:r>
+              <a:rPr lang="en-GB" sz="900" dirty="0">
+                <a:solidFill>
+                  <a:srgbClr val="000000"/>
+                </a:solidFill>
+                <a:latin typeface="Consolas" panose="020B0609020204030204" pitchFamily="49" charset="0"/>
+              </a:rPr>
+              <a:t>);</a:t>
+            </a:r>
+          </a:p>
+          <a:p>
+            <a:endParaRPr lang="en-GB" sz="900" dirty="0">
+              <a:solidFill>
+                <a:srgbClr val="0000FF"/>
+              </a:solidFill>
+              <a:latin typeface="Consolas" panose="020B0609020204030204" pitchFamily="49" charset="0"/>
+            </a:endParaRPr>
+          </a:p>
+          <a:p>
+            <a:r>
+              <a:rPr lang="en-GB" sz="900" dirty="0">
+                <a:solidFill>
+                  <a:srgbClr val="0000FF"/>
+                </a:solidFill>
+                <a:latin typeface="Consolas" panose="020B0609020204030204" pitchFamily="49" charset="0"/>
+              </a:rPr>
               <a:t>partial</a:t>
             </a:r>
             <a:r>
@@ -7307,20 +7572,40 @@
             <a:r>
               <a:rPr lang="en-GB" sz="900" dirty="0">
                 <a:solidFill>
+                  <a:srgbClr val="0000FF"/>
+                </a:solidFill>
+                <a:latin typeface="Consolas" panose="020B0609020204030204" pitchFamily="49" charset="0"/>
+              </a:rPr>
+              <a:t>    machine</a:t>
+            </a:r>
+            <a:r>
+              <a:rPr lang="en-GB" sz="900" dirty="0">
+                <a:solidFill>
                   <a:srgbClr val="000000"/>
                 </a:solidFill>
                 <a:latin typeface="Consolas" panose="020B0609020204030204" pitchFamily="49" charset="0"/>
               </a:rPr>
+              <a:t> Server;</a:t>
+            </a:r>
+          </a:p>
+          <a:p>
+            <a:r>
+              <a:rPr lang="en-GB" sz="900" dirty="0">
+                <a:solidFill>
+                  <a:srgbClr val="000000"/>
+                </a:solidFill>
+                <a:latin typeface="Consolas" panose="020B0609020204030204" pitchFamily="49" charset="0"/>
+              </a:rPr>
               <a:t>    </a:t>
             </a:r>
             <a:r>
-              <a:rPr lang="en-GB" sz="900" dirty="0">
+              <a:rPr lang="en-GB" sz="900" dirty="0" err="1">
                 <a:solidFill>
                   <a:srgbClr val="0000FF"/>
                 </a:solidFill>
                 <a:latin typeface="Consolas" panose="020B0609020204030204" pitchFamily="49" charset="0"/>
               </a:rPr>
-              <a:t>event</a:t>
+              <a:t>int</a:t>
             </a:r>
             <a:r>
               <a:rPr lang="en-GB" sz="900" dirty="0">
@@ -7329,155 +7614,7 @@
                 </a:solidFill>
                 <a:latin typeface="Consolas" panose="020B0609020204030204" pitchFamily="49" charset="0"/>
               </a:rPr>
-              <a:t> </a:t>
-            </a:r>
-            <a:r>
-              <a:rPr lang="en-GB" sz="900" dirty="0">
-                <a:solidFill>
-                  <a:srgbClr val="2B91AF"/>
-                </a:solidFill>
-                <a:latin typeface="Consolas" panose="020B0609020204030204" pitchFamily="49" charset="0"/>
-              </a:rPr>
-              <a:t>Config</a:t>
-            </a:r>
-            <a:r>
-              <a:rPr lang="en-GB" sz="900" dirty="0">
-                <a:solidFill>
-                  <a:srgbClr val="000000"/>
-                </a:solidFill>
-                <a:latin typeface="Consolas" panose="020B0609020204030204" pitchFamily="49" charset="0"/>
-              </a:rPr>
-              <a:t> (server: </a:t>
-            </a:r>
-            <a:r>
-              <a:rPr lang="en-GB" sz="900" dirty="0">
-                <a:solidFill>
-                  <a:srgbClr val="0000FF"/>
-                </a:solidFill>
-                <a:latin typeface="Consolas" panose="020B0609020204030204" pitchFamily="49" charset="0"/>
-              </a:rPr>
-              <a:t>machine</a:t>
-            </a:r>
-            <a:r>
-              <a:rPr lang="en-GB" sz="900" dirty="0">
-                <a:solidFill>
-                  <a:srgbClr val="000000"/>
-                </a:solidFill>
-                <a:latin typeface="Consolas" panose="020B0609020204030204" pitchFamily="49" charset="0"/>
-              </a:rPr>
-              <a:t>);</a:t>
-            </a:r>
-          </a:p>
-          <a:p>
-            <a:r>
-              <a:rPr lang="en-GB" sz="900" dirty="0">
-                <a:solidFill>
-                  <a:srgbClr val="000000"/>
-                </a:solidFill>
-                <a:latin typeface="Consolas" panose="020B0609020204030204" pitchFamily="49" charset="0"/>
-              </a:rPr>
-              <a:t>    </a:t>
-            </a:r>
-            <a:r>
-              <a:rPr lang="en-GB" sz="900" dirty="0">
-                <a:solidFill>
-                  <a:srgbClr val="0000FF"/>
-                </a:solidFill>
-                <a:latin typeface="Consolas" panose="020B0609020204030204" pitchFamily="49" charset="0"/>
-              </a:rPr>
-              <a:t>event</a:t>
-            </a:r>
-            <a:r>
-              <a:rPr lang="en-GB" sz="900" dirty="0">
-                <a:solidFill>
-                  <a:srgbClr val="000000"/>
-                </a:solidFill>
-                <a:latin typeface="Consolas" panose="020B0609020204030204" pitchFamily="49" charset="0"/>
-              </a:rPr>
-              <a:t> </a:t>
-            </a:r>
-            <a:r>
-              <a:rPr lang="en-GB" sz="900" dirty="0">
-                <a:solidFill>
-                  <a:srgbClr val="2B91AF"/>
-                </a:solidFill>
-                <a:latin typeface="Consolas" panose="020B0609020204030204" pitchFamily="49" charset="0"/>
-              </a:rPr>
-              <a:t>Unit</a:t>
-            </a:r>
-            <a:r>
-              <a:rPr lang="en-GB" sz="900" dirty="0">
-                <a:solidFill>
-                  <a:srgbClr val="000000"/>
-                </a:solidFill>
-                <a:latin typeface="Consolas" panose="020B0609020204030204" pitchFamily="49" charset="0"/>
-              </a:rPr>
-              <a:t>;</a:t>
-            </a:r>
-          </a:p>
-          <a:p>
-            <a:r>
-              <a:rPr lang="en-GB" sz="900" dirty="0">
-                <a:solidFill>
-                  <a:srgbClr val="000000"/>
-                </a:solidFill>
-                <a:latin typeface="Consolas" panose="020B0609020204030204" pitchFamily="49" charset="0"/>
-              </a:rPr>
-              <a:t>    </a:t>
-            </a:r>
-            <a:r>
-              <a:rPr lang="en-GB" sz="900" dirty="0">
-                <a:solidFill>
-                  <a:srgbClr val="0000FF"/>
-                </a:solidFill>
-                <a:latin typeface="Consolas" panose="020B0609020204030204" pitchFamily="49" charset="0"/>
-              </a:rPr>
-              <a:t>event</a:t>
-            </a:r>
-            <a:r>
-              <a:rPr lang="en-GB" sz="900" dirty="0">
-                <a:solidFill>
-                  <a:srgbClr val="000000"/>
-                </a:solidFill>
-                <a:latin typeface="Consolas" panose="020B0609020204030204" pitchFamily="49" charset="0"/>
-              </a:rPr>
-              <a:t> </a:t>
-            </a:r>
-            <a:r>
-              <a:rPr lang="en-GB" sz="900" dirty="0">
-                <a:solidFill>
-                  <a:srgbClr val="2B91AF"/>
-                </a:solidFill>
-                <a:latin typeface="Consolas" panose="020B0609020204030204" pitchFamily="49" charset="0"/>
-              </a:rPr>
-              <a:t>Ping</a:t>
-            </a:r>
-            <a:r>
-              <a:rPr lang="en-GB" sz="900" dirty="0">
-                <a:solidFill>
-                  <a:srgbClr val="000000"/>
-                </a:solidFill>
-                <a:latin typeface="Consolas" panose="020B0609020204030204" pitchFamily="49" charset="0"/>
-              </a:rPr>
-              <a:t> (client: </a:t>
-            </a:r>
-            <a:r>
-              <a:rPr lang="en-GB" sz="900" dirty="0">
-                <a:solidFill>
-                  <a:srgbClr val="0000FF"/>
-                </a:solidFill>
-                <a:latin typeface="Consolas" panose="020B0609020204030204" pitchFamily="49" charset="0"/>
-              </a:rPr>
-              <a:t>machine</a:t>
-            </a:r>
-            <a:r>
-              <a:rPr lang="en-GB" sz="900" dirty="0">
-                <a:solidFill>
-                  <a:srgbClr val="000000"/>
-                </a:solidFill>
-                <a:latin typeface="Consolas" panose="020B0609020204030204" pitchFamily="49" charset="0"/>
-              </a:rPr>
-              <a:t>);</a:t>
+              <a:t> Counter;</a:t>
             </a:r>
           </a:p>
           <a:p>
@@ -7505,7 +7642,7 @@
                 </a:solidFill>
                 <a:latin typeface="Consolas" panose="020B0609020204030204" pitchFamily="49" charset="0"/>
               </a:rPr>
-              <a:t>machine</a:t>
+              <a:t>start state</a:t>
             </a:r>
             <a:r>
               <a:rPr lang="en-GB" sz="900" dirty="0">
@@ -7514,39 +7651,17 @@
                 </a:solidFill>
                 <a:latin typeface="Consolas" panose="020B0609020204030204" pitchFamily="49" charset="0"/>
               </a:rPr>
-              <a:t> Server;</a:t>
-            </a:r>
-          </a:p>
-          <a:p>
-            <a:r>
-              <a:rPr lang="en-GB" sz="900" dirty="0">
-                <a:solidFill>
-                  <a:srgbClr val="000000"/>
-                </a:solidFill>
-                <a:latin typeface="Consolas" panose="020B0609020204030204" pitchFamily="49" charset="0"/>
-              </a:rPr>
-              <a:t>    </a:t>
+              <a:t> </a:t>
             </a:r>
             <a:r>
               <a:rPr lang="en-GB" sz="900" dirty="0" err="1">
                 <a:solidFill>
-                  <a:srgbClr val="0000FF"/>
-                </a:solidFill>
-                <a:latin typeface="Consolas" panose="020B0609020204030204" pitchFamily="49" charset="0"/>
-              </a:rPr>
-              <a:t>int</a:t>
-            </a:r>
-            <a:r>
-              <a:rPr lang="en-GB" sz="900" dirty="0">
-                <a:solidFill>
-                  <a:srgbClr val="000000"/>
-                </a:solidFill>
-                <a:latin typeface="Consolas" panose="020B0609020204030204" pitchFamily="49" charset="0"/>
-              </a:rPr>
-              <a:t> Counter;</a:t>
-            </a:r>
-          </a:p>
-          <a:p>
+                  <a:srgbClr val="2B91AF"/>
+                </a:solidFill>
+                <a:latin typeface="Consolas" panose="020B0609020204030204" pitchFamily="49" charset="0"/>
+              </a:rPr>
+              <a:t>Init</a:t>
+            </a:r>
             <a:endParaRPr lang="en-GB" sz="900" dirty="0">
               <a:solidFill>
                 <a:srgbClr val="000000"/>
@@ -7562,7 +7677,18 @@
                 </a:solidFill>
                 <a:latin typeface="Consolas" panose="020B0609020204030204" pitchFamily="49" charset="0"/>
               </a:rPr>
-              <a:t>    </a:t>
+              <a:t>    {</a:t>
+            </a:r>
+          </a:p>
+          <a:p>
+            <a:r>
+              <a:rPr lang="en-GB" sz="900" dirty="0">
+                <a:solidFill>
+                  <a:srgbClr val="000000"/>
+                </a:solidFill>
+                <a:latin typeface="Consolas" panose="020B0609020204030204" pitchFamily="49" charset="0"/>
+              </a:rPr>
+              <a:t>        </a:t>
             </a:r>
             <a:r>
               <a:rPr lang="en-GB" sz="900" dirty="0">
@@ -7571,8 +7697,16 @@
                 </a:solidFill>
                 <a:latin typeface="Consolas" panose="020B0609020204030204" pitchFamily="49" charset="0"/>
               </a:rPr>
-              <a:t>start state</a:t>
-            </a:r>
+              <a:t>entry</a:t>
+            </a:r>
+            <a:endParaRPr lang="en-GB" sz="900" dirty="0">
+              <a:solidFill>
+                <a:srgbClr val="0070C0"/>
+              </a:solidFill>
+              <a:latin typeface="Consolas" panose="020B0609020204030204" pitchFamily="49" charset="0"/>
+            </a:endParaRPr>
+          </a:p>
+          <a:p>
             <a:r>
               <a:rPr lang="en-GB" sz="900" dirty="0">
                 <a:solidFill>
@@ -7580,17 +7714,155 @@
                 </a:solidFill>
                 <a:latin typeface="Consolas" panose="020B0609020204030204" pitchFamily="49" charset="0"/>
               </a:rPr>
-              <a:t> </a:t>
+              <a:t>        {</a:t>
+            </a:r>
+          </a:p>
+          <a:p>
+            <a:r>
+              <a:rPr lang="en-GB" sz="900" dirty="0">
+                <a:solidFill>
+                  <a:srgbClr val="000000"/>
+                </a:solidFill>
+                <a:latin typeface="Consolas" panose="020B0609020204030204" pitchFamily="49" charset="0"/>
+              </a:rPr>
+              <a:t>            </a:t>
             </a:r>
             <a:r>
               <a:rPr lang="en-GB" sz="900" dirty="0" err="1">
                 <a:solidFill>
-                  <a:srgbClr val="2B91AF"/>
-                </a:solidFill>
-                <a:latin typeface="Consolas" panose="020B0609020204030204" pitchFamily="49" charset="0"/>
-              </a:rPr>
-              <a:t>Init</a:t>
-            </a:r>
+                  <a:srgbClr val="0000FF"/>
+                </a:solidFill>
+                <a:latin typeface="Consolas" panose="020B0609020204030204" pitchFamily="49" charset="0"/>
+              </a:rPr>
+              <a:t>this</a:t>
+            </a:r>
+            <a:r>
+              <a:rPr lang="en-GB" sz="900" dirty="0" err="1">
+                <a:solidFill>
+                  <a:srgbClr val="000000"/>
+                </a:solidFill>
+                <a:latin typeface="Consolas" panose="020B0609020204030204" pitchFamily="49" charset="0"/>
+              </a:rPr>
+              <a:t>.Server</a:t>
+            </a:r>
+            <a:r>
+              <a:rPr lang="en-GB" sz="900" dirty="0">
+                <a:solidFill>
+                  <a:srgbClr val="000000"/>
+                </a:solidFill>
+                <a:latin typeface="Consolas" panose="020B0609020204030204" pitchFamily="49" charset="0"/>
+              </a:rPr>
+              <a:t> = (</a:t>
+            </a:r>
+            <a:r>
+              <a:rPr lang="en-GB" sz="900" dirty="0">
+                <a:solidFill>
+                  <a:srgbClr val="0000FF"/>
+                </a:solidFill>
+                <a:latin typeface="Consolas" panose="020B0609020204030204" pitchFamily="49" charset="0"/>
+              </a:rPr>
+              <a:t>trigger as</a:t>
+            </a:r>
+            <a:r>
+              <a:rPr lang="en-GB" sz="900" dirty="0">
+                <a:solidFill>
+                  <a:srgbClr val="000000"/>
+                </a:solidFill>
+                <a:latin typeface="Consolas" panose="020B0609020204030204" pitchFamily="49" charset="0"/>
+              </a:rPr>
+              <a:t> Config).server;</a:t>
+            </a:r>
+          </a:p>
+          <a:p>
+            <a:r>
+              <a:rPr lang="en-GB" sz="900" dirty="0">
+                <a:solidFill>
+                  <a:srgbClr val="000000"/>
+                </a:solidFill>
+                <a:latin typeface="Consolas" panose="020B0609020204030204" pitchFamily="49" charset="0"/>
+              </a:rPr>
+              <a:t>            </a:t>
+            </a:r>
+            <a:r>
+              <a:rPr lang="en-GB" sz="900" dirty="0" err="1">
+                <a:solidFill>
+                  <a:srgbClr val="0000FF"/>
+                </a:solidFill>
+                <a:latin typeface="Consolas" panose="020B0609020204030204" pitchFamily="49" charset="0"/>
+              </a:rPr>
+              <a:t>this</a:t>
+            </a:r>
+            <a:r>
+              <a:rPr lang="en-GB" sz="900" dirty="0" err="1">
+                <a:solidFill>
+                  <a:srgbClr val="000000"/>
+                </a:solidFill>
+                <a:latin typeface="Consolas" panose="020B0609020204030204" pitchFamily="49" charset="0"/>
+              </a:rPr>
+              <a:t>.Counter</a:t>
+            </a:r>
+            <a:r>
+              <a:rPr lang="en-GB" sz="900" dirty="0">
+                <a:solidFill>
+                  <a:srgbClr val="000000"/>
+                </a:solidFill>
+                <a:latin typeface="Consolas" panose="020B0609020204030204" pitchFamily="49" charset="0"/>
+              </a:rPr>
+              <a:t> = 0;</a:t>
+            </a:r>
+          </a:p>
+          <a:p>
+            <a:r>
+              <a:rPr lang="en-GB" sz="900" dirty="0">
+                <a:solidFill>
+                  <a:srgbClr val="000000"/>
+                </a:solidFill>
+                <a:latin typeface="Consolas" panose="020B0609020204030204" pitchFamily="49" charset="0"/>
+              </a:rPr>
+              <a:t>            </a:t>
+            </a:r>
+            <a:r>
+              <a:rPr lang="en-GB" sz="900" dirty="0">
+                <a:solidFill>
+                  <a:srgbClr val="0000FF"/>
+                </a:solidFill>
+                <a:latin typeface="Consolas" panose="020B0609020204030204" pitchFamily="49" charset="0"/>
+              </a:rPr>
+              <a:t>jump</a:t>
+            </a:r>
+            <a:r>
+              <a:rPr lang="en-GB" sz="900" dirty="0">
+                <a:solidFill>
+                  <a:srgbClr val="000000"/>
+                </a:solidFill>
+                <a:latin typeface="Consolas" panose="020B0609020204030204" pitchFamily="49" charset="0"/>
+              </a:rPr>
+              <a:t>(Active);</a:t>
+            </a:r>
+          </a:p>
+          <a:p>
+            <a:r>
+              <a:rPr lang="en-GB" sz="900" dirty="0">
+                <a:solidFill>
+                  <a:srgbClr val="000000"/>
+                </a:solidFill>
+                <a:latin typeface="Consolas" panose="020B0609020204030204" pitchFamily="49" charset="0"/>
+              </a:rPr>
+              <a:t>        }</a:t>
+            </a:r>
+          </a:p>
+          <a:p>
+            <a:r>
+              <a:rPr lang="en-GB" sz="900" dirty="0">
+                <a:solidFill>
+                  <a:srgbClr val="000000"/>
+                </a:solidFill>
+                <a:latin typeface="Consolas" panose="020B0609020204030204" pitchFamily="49" charset="0"/>
+              </a:rPr>
+              <a:t>    }</a:t>
+            </a:r>
+          </a:p>
+          <a:p>
             <a:endParaRPr lang="en-GB" sz="900" dirty="0">
               <a:solidFill>
                 <a:srgbClr val="000000"/>
@@ -7606,6 +7878,50 @@
                 </a:solidFill>
                 <a:latin typeface="Consolas" panose="020B0609020204030204" pitchFamily="49" charset="0"/>
               </a:rPr>
+              <a:t>    </a:t>
+            </a:r>
+            <a:r>
+              <a:rPr lang="en-GB" sz="900" dirty="0">
+                <a:solidFill>
+                  <a:srgbClr val="0000FF"/>
+                </a:solidFill>
+                <a:latin typeface="Consolas" panose="020B0609020204030204" pitchFamily="49" charset="0"/>
+              </a:rPr>
+              <a:t>state</a:t>
+            </a:r>
+            <a:r>
+              <a:rPr lang="en-GB" sz="900" dirty="0">
+                <a:solidFill>
+                  <a:srgbClr val="000000"/>
+                </a:solidFill>
+                <a:latin typeface="Consolas" panose="020B0609020204030204" pitchFamily="49" charset="0"/>
+              </a:rPr>
+              <a:t> </a:t>
+            </a:r>
+            <a:r>
+              <a:rPr lang="en-GB" sz="900" dirty="0">
+                <a:solidFill>
+                  <a:srgbClr val="2B91AF"/>
+                </a:solidFill>
+                <a:latin typeface="Consolas" panose="020B0609020204030204" pitchFamily="49" charset="0"/>
+              </a:rPr>
+              <a:t>Active</a:t>
+            </a:r>
+            <a:endParaRPr lang="en-GB" sz="900" dirty="0">
+              <a:solidFill>
+                <a:srgbClr val="000000"/>
+              </a:solidFill>
+              <a:latin typeface="Consolas" panose="020B0609020204030204" pitchFamily="49" charset="0"/>
+            </a:endParaRPr>
+          </a:p>
+          <a:p>
+            <a:r>
+              <a:rPr lang="en-GB" sz="900" dirty="0">
+                <a:solidFill>
+                  <a:srgbClr val="000000"/>
+                </a:solidFill>
+                <a:latin typeface="Consolas" panose="020B0609020204030204" pitchFamily="49" charset="0"/>
+              </a:rPr>
               <a:t>    {</a:t>
             </a:r>
           </a:p>
@@ -7659,20 +7975,11 @@
             <a:r>
               <a:rPr lang="en-GB" sz="900" dirty="0" err="1">
                 <a:solidFill>
-                  <a:srgbClr val="0000FF"/>
-                </a:solidFill>
-                <a:latin typeface="Consolas" panose="020B0609020204030204" pitchFamily="49" charset="0"/>
-              </a:rPr>
-              <a:t>this</a:t>
-            </a:r>
-            <a:r>
-              <a:rPr lang="en-GB" sz="900" dirty="0" err="1">
-                <a:solidFill>
                   <a:srgbClr val="000000"/>
                 </a:solidFill>
                 <a:latin typeface="Consolas" panose="020B0609020204030204" pitchFamily="49" charset="0"/>
               </a:rPr>
-              <a:t>.Server</a:t>
+              <a:t>SendPing</a:t>
             </a:r>
             <a:r>
               <a:rPr lang="en-GB" sz="900" dirty="0">
@@ -7681,17 +7988,10 @@
                 </a:solidFill>
                 <a:latin typeface="Consolas" panose="020B0609020204030204" pitchFamily="49" charset="0"/>
               </a:rPr>
-              <a:t> = (</a:t>
-            </a:r>
-            <a:r>
-              <a:rPr lang="en-GB" sz="900" dirty="0">
-                <a:solidFill>
-                  <a:srgbClr val="0000FF"/>
-                </a:solidFill>
-                <a:latin typeface="Consolas" panose="020B0609020204030204" pitchFamily="49" charset="0"/>
-              </a:rPr>
-              <a:t>trigger as</a:t>
-            </a:r>
+              <a:t>();</a:t>
+            </a:r>
+          </a:p>
+          <a:p>
             <a:r>
               <a:rPr lang="en-GB" sz="900" dirty="0">
                 <a:solidFill>
@@ -7699,96 +7999,7 @@
                 </a:solidFill>
                 <a:latin typeface="Consolas" panose="020B0609020204030204" pitchFamily="49" charset="0"/>
               </a:rPr>
-              <a:t> Config).server;</a:t>
-            </a:r>
-          </a:p>
-          <a:p>
-            <a:r>
-              <a:rPr lang="en-GB" sz="900" dirty="0">
-                <a:solidFill>
-                  <a:srgbClr val="000000"/>
-                </a:solidFill>
-                <a:latin typeface="Consolas" panose="020B0609020204030204" pitchFamily="49" charset="0"/>
-              </a:rPr>
-              <a:t>            </a:t>
-            </a:r>
-            <a:r>
-              <a:rPr lang="en-GB" sz="900" dirty="0" err="1">
-                <a:solidFill>
-                  <a:srgbClr val="0000FF"/>
-                </a:solidFill>
-                <a:latin typeface="Consolas" panose="020B0609020204030204" pitchFamily="49" charset="0"/>
-              </a:rPr>
-              <a:t>this</a:t>
-            </a:r>
-            <a:r>
-              <a:rPr lang="en-GB" sz="900" dirty="0" err="1">
-                <a:solidFill>
-                  <a:srgbClr val="000000"/>
-                </a:solidFill>
-                <a:latin typeface="Consolas" panose="020B0609020204030204" pitchFamily="49" charset="0"/>
-              </a:rPr>
-              <a:t>.Counter</a:t>
-            </a:r>
-            <a:r>
-              <a:rPr lang="en-GB" sz="900" dirty="0">
-                <a:solidFill>
-                  <a:srgbClr val="000000"/>
-                </a:solidFill>
-                <a:latin typeface="Consolas" panose="020B0609020204030204" pitchFamily="49" charset="0"/>
-              </a:rPr>
-              <a:t> = 0;</a:t>
-            </a:r>
-          </a:p>
-          <a:p>
-            <a:r>
-              <a:rPr lang="en-GB" sz="900" dirty="0">
-                <a:solidFill>
-                  <a:srgbClr val="000000"/>
-                </a:solidFill>
-                <a:latin typeface="Consolas" panose="020B0609020204030204" pitchFamily="49" charset="0"/>
-              </a:rPr>
-              <a:t>            </a:t>
-            </a:r>
-            <a:r>
-              <a:rPr lang="en-GB" sz="900" dirty="0">
-                <a:solidFill>
-                  <a:srgbClr val="0000FF"/>
-                </a:solidFill>
-                <a:latin typeface="Consolas" panose="020B0609020204030204" pitchFamily="49" charset="0"/>
-              </a:rPr>
-              <a:t>jump</a:t>
-            </a:r>
-            <a:r>
-              <a:rPr lang="en-GB" sz="900" dirty="0">
-                <a:solidFill>
-                  <a:srgbClr val="000000"/>
-                </a:solidFill>
-                <a:latin typeface="Consolas" panose="020B0609020204030204" pitchFamily="49" charset="0"/>
-              </a:rPr>
-              <a:t>(Active);</a:t>
-            </a:r>
-          </a:p>
-          <a:p>
-            <a:r>
-              <a:rPr lang="en-GB" sz="900" dirty="0">
-                <a:solidFill>
-                  <a:srgbClr val="000000"/>
-                </a:solidFill>
-                <a:latin typeface="Consolas" panose="020B0609020204030204" pitchFamily="49" charset="0"/>
-              </a:rPr>
               <a:t>        }</a:t>
-            </a:r>
-          </a:p>
-          <a:p>
-            <a:r>
-              <a:rPr lang="en-GB" sz="900" dirty="0">
-                <a:solidFill>
-                  <a:srgbClr val="000000"/>
-                </a:solidFill>
-                <a:latin typeface="Consolas" panose="020B0609020204030204" pitchFamily="49" charset="0"/>
-              </a:rPr>
-              <a:t>    }</a:t>
             </a:r>
           </a:p>
           <a:p>
@@ -7807,7 +8018,7 @@
                 </a:solidFill>
                 <a:latin typeface="Consolas" panose="020B0609020204030204" pitchFamily="49" charset="0"/>
               </a:rPr>
-              <a:t>    </a:t>
+              <a:t>        </a:t>
             </a:r>
             <a:r>
               <a:rPr lang="en-GB" sz="900" dirty="0">
@@ -7816,7 +8027,7 @@
                 </a:solidFill>
                 <a:latin typeface="Consolas" panose="020B0609020204030204" pitchFamily="49" charset="0"/>
               </a:rPr>
-              <a:t>state</a:t>
+              <a:t>on</a:t>
             </a:r>
             <a:r>
               <a:rPr lang="en-GB" sz="900" dirty="0">
@@ -7825,165 +8036,7 @@
                 </a:solidFill>
                 <a:latin typeface="Consolas" panose="020B0609020204030204" pitchFamily="49" charset="0"/>
               </a:rPr>
-              <a:t> </a:t>
-            </a:r>
-            <a:r>
-              <a:rPr lang="en-GB" sz="900" dirty="0">
-                <a:solidFill>
-                  <a:srgbClr val="2B91AF"/>
-                </a:solidFill>
-                <a:latin typeface="Consolas" panose="020B0609020204030204" pitchFamily="49" charset="0"/>
-              </a:rPr>
-              <a:t>Active</a:t>
-            </a:r>
-            <a:endParaRPr lang="en-GB" sz="900" dirty="0">
-              <a:solidFill>
-                <a:srgbClr val="000000"/>
-              </a:solidFill>
-              <a:latin typeface="Consolas" panose="020B0609020204030204" pitchFamily="49" charset="0"/>
-            </a:endParaRPr>
-          </a:p>
-          <a:p>
-            <a:r>
-              <a:rPr lang="en-GB" sz="900" dirty="0">
-                <a:solidFill>
-                  <a:srgbClr val="000000"/>
-                </a:solidFill>
-                <a:latin typeface="Consolas" panose="020B0609020204030204" pitchFamily="49" charset="0"/>
-              </a:rPr>
-              <a:t>    {</a:t>
-            </a:r>
-          </a:p>
-          <a:p>
-            <a:r>
-              <a:rPr lang="en-GB" sz="900" dirty="0">
-                <a:solidFill>
-                  <a:srgbClr val="000000"/>
-                </a:solidFill>
-                <a:latin typeface="Consolas" panose="020B0609020204030204" pitchFamily="49" charset="0"/>
-              </a:rPr>
-              <a:t>        </a:t>
-            </a:r>
-            <a:r>
-              <a:rPr lang="en-GB" sz="900" dirty="0">
-                <a:solidFill>
-                  <a:srgbClr val="0000FF"/>
-                </a:solidFill>
-                <a:latin typeface="Consolas" panose="020B0609020204030204" pitchFamily="49" charset="0"/>
-              </a:rPr>
-              <a:t>entry</a:t>
-            </a:r>
-            <a:endParaRPr lang="en-GB" sz="900" dirty="0">
-              <a:solidFill>
-                <a:srgbClr val="0070C0"/>
-              </a:solidFill>
-              <a:latin typeface="Consolas" panose="020B0609020204030204" pitchFamily="49" charset="0"/>
-            </a:endParaRPr>
-          </a:p>
-          <a:p>
-            <a:r>
-              <a:rPr lang="en-GB" sz="900" dirty="0">
-                <a:solidFill>
-                  <a:srgbClr val="000000"/>
-                </a:solidFill>
-                <a:latin typeface="Consolas" panose="020B0609020204030204" pitchFamily="49" charset="0"/>
-              </a:rPr>
-              <a:t>        {</a:t>
-            </a:r>
-          </a:p>
-          <a:p>
-            <a:r>
-              <a:rPr lang="en-GB" sz="900" dirty="0">
-                <a:solidFill>
-                  <a:srgbClr val="000000"/>
-                </a:solidFill>
-                <a:latin typeface="Consolas" panose="020B0609020204030204" pitchFamily="49" charset="0"/>
-              </a:rPr>
-              <a:t>            </a:t>
-            </a:r>
-            <a:r>
-              <a:rPr lang="en-GB" sz="900" dirty="0" err="1">
-                <a:solidFill>
-                  <a:srgbClr val="000000"/>
-                </a:solidFill>
-                <a:latin typeface="Consolas" panose="020B0609020204030204" pitchFamily="49" charset="0"/>
-              </a:rPr>
-              <a:t>SendPing</a:t>
-            </a:r>
-            <a:r>
-              <a:rPr lang="en-GB" sz="900" dirty="0">
-                <a:solidFill>
-                  <a:srgbClr val="000000"/>
-                </a:solidFill>
-                <a:latin typeface="Consolas" panose="020B0609020204030204" pitchFamily="49" charset="0"/>
-              </a:rPr>
-              <a:t>();</a:t>
-            </a:r>
-          </a:p>
-          <a:p>
-            <a:r>
-              <a:rPr lang="en-GB" sz="900" dirty="0">
-                <a:solidFill>
-                  <a:srgbClr val="000000"/>
-                </a:solidFill>
-                <a:latin typeface="Consolas" panose="020B0609020204030204" pitchFamily="49" charset="0"/>
-              </a:rPr>
-              <a:t>        }</a:t>
-            </a:r>
-          </a:p>
-          <a:p>
-            <a:endParaRPr lang="en-GB" sz="900" dirty="0">
-              <a:solidFill>
-                <a:srgbClr val="000000"/>
-              </a:solidFill>
-              <a:latin typeface="Consolas" panose="020B0609020204030204" pitchFamily="49" charset="0"/>
-            </a:endParaRPr>
-          </a:p>
-          <a:p>
-            <a:r>
-              <a:rPr lang="en-GB" sz="900" dirty="0">
-                <a:solidFill>
-                  <a:srgbClr val="000000"/>
-                </a:solidFill>
-                <a:latin typeface="Consolas" panose="020B0609020204030204" pitchFamily="49" charset="0"/>
-              </a:rPr>
-              <a:t>        </a:t>
-            </a:r>
-            <a:r>
-              <a:rPr lang="en-GB" sz="900" dirty="0">
-                <a:solidFill>
-                  <a:srgbClr val="0000FF"/>
-                </a:solidFill>
-                <a:latin typeface="Consolas" panose="020B0609020204030204" pitchFamily="49" charset="0"/>
-              </a:rPr>
-              <a:t>on</a:t>
-            </a:r>
-            <a:r>
-              <a:rPr lang="en-GB" sz="900" dirty="0">
-                <a:solidFill>
-                  <a:srgbClr val="000000"/>
-                </a:solidFill>
-                <a:latin typeface="Consolas" panose="020B0609020204030204" pitchFamily="49" charset="0"/>
-              </a:rPr>
-              <a:t> </a:t>
-            </a:r>
-            <a:r>
-              <a:rPr lang="en-GB" sz="900" dirty="0" err="1">
-                <a:solidFill>
-                  <a:srgbClr val="000000"/>
-                </a:solidFill>
-                <a:latin typeface="Consolas" panose="020B0609020204030204" pitchFamily="49" charset="0"/>
-              </a:rPr>
-              <a:t>Server.Pong</a:t>
-            </a:r>
-            <a:r>
-              <a:rPr lang="en-GB" sz="900" dirty="0">
-                <a:solidFill>
-                  <a:srgbClr val="000000"/>
-                </a:solidFill>
-                <a:latin typeface="Consolas" panose="020B0609020204030204" pitchFamily="49" charset="0"/>
-              </a:rPr>
-              <a:t> </a:t>
+              <a:t> Pong </a:t>
             </a:r>
             <a:r>
               <a:rPr lang="en-GB" sz="900" dirty="0">
@@ -8739,25 +8792,7 @@
                 </a:solidFill>
                 <a:latin typeface="Consolas" panose="020B0609020204030204" pitchFamily="49" charset="0"/>
               </a:rPr>
-              <a:t>(Client, </a:t>
-            </a:r>
-            <a:r>
-              <a:rPr lang="en-GB" sz="900" dirty="0" err="1">
-                <a:solidFill>
-                  <a:srgbClr val="000000"/>
-                </a:solidFill>
-                <a:latin typeface="Consolas" panose="020B0609020204030204" pitchFamily="49" charset="0"/>
-              </a:rPr>
-              <a:t>Client.Config</a:t>
-            </a:r>
-            <a:r>
-              <a:rPr lang="en-GB" sz="900" dirty="0">
-                <a:solidFill>
-                  <a:srgbClr val="000000"/>
-                </a:solidFill>
-                <a:latin typeface="Consolas" panose="020B0609020204030204" pitchFamily="49" charset="0"/>
-              </a:rPr>
-              <a:t>, server);</a:t>
+              <a:t>(Client, Config, server);</a:t>
             </a:r>
           </a:p>
           <a:p>
@@ -10362,7 +10397,7 @@
 </p:sld>
 </file>
 
-<file path=ppt/slides/slide16.xml><?xml version="1.0" encoding="utf-8"?>
+<file path=ppt/slides/slide18.xml><?xml version="1.0" encoding="utf-8"?>
 <p:sld xmlns:a="http://schemas.openxmlformats.org/drawingml/2006/main" xmlns:r="http://schemas.openxmlformats.org/officeDocument/2006/relationships" xmlns:p="http://schemas.openxmlformats.org/presentationml/2006/main">
   <p:cSld>
     <p:spTree>
@@ -10494,7 +10529,7 @@
 </p:sld>
 </file>
 
-<file path=ppt/slides/slide17.xml><?xml version="1.0" encoding="utf-8"?>
+<file path=ppt/slides/slide19.xml><?xml version="1.0" encoding="utf-8"?>
 <p:sld xmlns:a="http://schemas.openxmlformats.org/drawingml/2006/main" xmlns:r="http://schemas.openxmlformats.org/officeDocument/2006/relationships" xmlns:p="http://schemas.openxmlformats.org/presentationml/2006/main">
   <p:cSld>
     <p:spTree>
@@ -10601,7 +10636,332 @@
 </p:sld>
 </file>
 
-<file path=ppt/slides/slide18.xml><?xml version="1.0" encoding="utf-8"?>
+<file path=ppt/slides/slide2.xml><?xml version="1.0" encoding="utf-8"?>
+<p:sld xmlns:a="http://schemas.openxmlformats.org/drawingml/2006/main" xmlns:r="http://schemas.openxmlformats.org/officeDocument/2006/relationships" xmlns:p="http://schemas.openxmlformats.org/presentationml/2006/main">
+  <p:cSld>
+    <p:spTree>
+      <p:nvGrpSpPr>
+        <p:cNvPr id="1" name=""/>
+        <p:cNvGrpSpPr/>
+        <p:nvPr/>
+      </p:nvGrpSpPr>
+      <p:grpSpPr>
+        <a:xfrm>
+          <a:off x="0" y="0"/>
+          <a:ext cx="0" cy="0"/>
+          <a:chOff x="0" y="0"/>
+          <a:chExt cx="0" cy="0"/>
+        </a:xfrm>
+      </p:grpSpPr>
+      <p:sp>
+        <p:nvSpPr>
+          <p:cNvPr id="2" name="Title 1"/>
+          <p:cNvSpPr>
+            <a:spLocks noGrp="1"/>
+          </p:cNvSpPr>
+          <p:nvPr>
+            <p:ph type="title"/>
+          </p:nvPr>
+        </p:nvSpPr>
+        <p:spPr/>
+        <p:txBody>
+          <a:bodyPr/>
+          <a:lstStyle/>
+          <a:p>
+            <a:r>
+              <a:rPr lang="en-US" dirty="0"/>
+              <a:t>The Heisenbug problem</a:t>
+            </a:r>
+          </a:p>
+        </p:txBody>
+      </p:sp>
+      <p:sp>
+        <p:nvSpPr>
+          <p:cNvPr id="6" name="Rectangle 5"/>
+          <p:cNvSpPr/>
+          <p:nvPr/>
+        </p:nvSpPr>
+        <p:spPr>
+          <a:xfrm>
+            <a:off x="5848285" y="2011680"/>
+            <a:ext cx="2225040" cy="1270000"/>
+          </a:xfrm>
+          <a:prstGeom prst="rect">
+            <a:avLst/>
+          </a:prstGeom>
+          <a:noFill/>
+          <a:ln w="25400">
+            <a:solidFill>
+              <a:schemeClr val="tx1"/>
+            </a:solidFill>
+          </a:ln>
+        </p:spPr>
+        <p:style>
+          <a:lnRef idx="2">
+            <a:schemeClr val="accent1">
+              <a:shade val="50000"/>
+            </a:schemeClr>
+          </a:lnRef>
+          <a:fillRef idx="1">
+            <a:schemeClr val="accent1"/>
+          </a:fillRef>
+          <a:effectRef idx="0">
+            <a:schemeClr val="accent1"/>
+          </a:effectRef>
+          <a:fontRef idx="minor">
+            <a:schemeClr val="lt1"/>
+          </a:fontRef>
+        </p:style>
+        <p:txBody>
+          <a:bodyPr rtlCol="0" anchor="ctr"/>
+          <a:lstStyle/>
+          <a:p>
+            <a:pPr algn="ctr"/>
+            <a:endParaRPr lang="en-US"/>
+          </a:p>
+        </p:txBody>
+      </p:sp>
+      <p:sp>
+        <p:nvSpPr>
+          <p:cNvPr id="7" name="TextBox 6"/>
+          <p:cNvSpPr txBox="1"/>
+          <p:nvPr/>
+        </p:nvSpPr>
+        <p:spPr>
+          <a:xfrm>
+            <a:off x="3015991" y="2410460"/>
+            <a:ext cx="1222258" cy="523220"/>
+          </a:xfrm>
+          <a:prstGeom prst="rect">
+            <a:avLst/>
+          </a:prstGeom>
+          <a:noFill/>
+        </p:spPr>
+        <p:txBody>
+          <a:bodyPr wrap="none" rtlCol="0">
+            <a:spAutoFit/>
+          </a:bodyPr>
+          <a:lstStyle/>
+          <a:p>
+            <a:r>
+              <a:rPr lang="en-US" sz="2800" dirty="0"/>
+              <a:t>System</a:t>
+            </a:r>
+          </a:p>
+        </p:txBody>
+      </p:sp>
+      <p:sp>
+        <p:nvSpPr>
+          <p:cNvPr id="8" name="TextBox 7"/>
+          <p:cNvSpPr txBox="1"/>
+          <p:nvPr/>
+        </p:nvSpPr>
+        <p:spPr>
+          <a:xfrm>
+            <a:off x="5933440" y="2410460"/>
+            <a:ext cx="2054730" cy="523220"/>
+          </a:xfrm>
+          <a:prstGeom prst="rect">
+            <a:avLst/>
+          </a:prstGeom>
+          <a:noFill/>
+        </p:spPr>
+        <p:txBody>
+          <a:bodyPr wrap="none" rtlCol="0">
+            <a:spAutoFit/>
+          </a:bodyPr>
+          <a:lstStyle/>
+          <a:p>
+            <a:r>
+              <a:rPr lang="en-US" sz="2800" dirty="0"/>
+              <a:t>Environment</a:t>
+            </a:r>
+          </a:p>
+        </p:txBody>
+      </p:sp>
+      <p:sp>
+        <p:nvSpPr>
+          <p:cNvPr id="9" name="Rectangle 8"/>
+          <p:cNvSpPr/>
+          <p:nvPr/>
+        </p:nvSpPr>
+        <p:spPr>
+          <a:xfrm>
+            <a:off x="2514600" y="2011680"/>
+            <a:ext cx="2225040" cy="1270000"/>
+          </a:xfrm>
+          <a:prstGeom prst="rect">
+            <a:avLst/>
+          </a:prstGeom>
+          <a:noFill/>
+          <a:ln w="25400">
+            <a:solidFill>
+              <a:schemeClr val="tx1"/>
+            </a:solidFill>
+          </a:ln>
+        </p:spPr>
+        <p:style>
+          <a:lnRef idx="2">
+            <a:schemeClr val="accent1">
+              <a:shade val="50000"/>
+            </a:schemeClr>
+          </a:lnRef>
+          <a:fillRef idx="1">
+            <a:schemeClr val="accent1"/>
+          </a:fillRef>
+          <a:effectRef idx="0">
+            <a:schemeClr val="accent1"/>
+          </a:effectRef>
+          <a:fontRef idx="minor">
+            <a:schemeClr val="lt1"/>
+          </a:fontRef>
+        </p:style>
+        <p:txBody>
+          <a:bodyPr rtlCol="0" anchor="ctr"/>
+          <a:lstStyle/>
+          <a:p>
+            <a:pPr algn="ctr"/>
+            <a:endParaRPr lang="en-US"/>
+          </a:p>
+        </p:txBody>
+      </p:sp>
+      <p:cxnSp>
+        <p:nvCxnSpPr>
+          <p:cNvPr id="13" name="Straight Arrow Connector 12"/>
+          <p:cNvCxnSpPr>
+            <a:stCxn id="9" idx="3"/>
+            <a:endCxn id="6" idx="1"/>
+          </p:cNvCxnSpPr>
+          <p:nvPr/>
+        </p:nvCxnSpPr>
+        <p:spPr>
+          <a:xfrm>
+            <a:off x="4739640" y="2646680"/>
+            <a:ext cx="1108645" cy="0"/>
+          </a:xfrm>
+          <a:prstGeom prst="straightConnector1">
+            <a:avLst/>
+          </a:prstGeom>
+          <a:ln w="25400">
+            <a:solidFill>
+              <a:schemeClr val="tx1"/>
+            </a:solidFill>
+            <a:headEnd type="triangle"/>
+            <a:tailEnd type="triangle"/>
+          </a:ln>
+        </p:spPr>
+        <p:style>
+          <a:lnRef idx="1">
+            <a:schemeClr val="accent1"/>
+          </a:lnRef>
+          <a:fillRef idx="0">
+            <a:schemeClr val="accent1"/>
+          </a:fillRef>
+          <a:effectRef idx="0">
+            <a:schemeClr val="accent1"/>
+          </a:effectRef>
+          <a:fontRef idx="minor">
+            <a:schemeClr val="tx1"/>
+          </a:fontRef>
+        </p:style>
+      </p:cxnSp>
+      <p:sp>
+        <p:nvSpPr>
+          <p:cNvPr id="15" name="TextBox 14"/>
+          <p:cNvSpPr txBox="1"/>
+          <p:nvPr/>
+        </p:nvSpPr>
+        <p:spPr>
+          <a:xfrm>
+            <a:off x="1244600" y="3683952"/>
+            <a:ext cx="10170413" cy="2123658"/>
+          </a:xfrm>
+          <a:prstGeom prst="rect">
+            <a:avLst/>
+          </a:prstGeom>
+          <a:noFill/>
+        </p:spPr>
+        <p:txBody>
+          <a:bodyPr wrap="none" rtlCol="0">
+            <a:spAutoFit/>
+          </a:bodyPr>
+          <a:lstStyle/>
+          <a:p>
+            <a:pPr marL="342900" indent="-342900">
+              <a:buFont typeface="Arial" panose="020B0604020202020204" pitchFamily="34" charset="0"/>
+              <a:buChar char="•"/>
+            </a:pPr>
+            <a:r>
+              <a:rPr lang="en-US" sz="2400" dirty="0"/>
+              <a:t>Happen when interaction between system and environment is uncontrollable</a:t>
+            </a:r>
+          </a:p>
+          <a:p>
+            <a:pPr marL="800100" lvl="1" indent="-342900">
+              <a:buFont typeface="Arial" panose="020B0604020202020204" pitchFamily="34" charset="0"/>
+              <a:buChar char="•"/>
+            </a:pPr>
+            <a:r>
+              <a:rPr lang="en-US" sz="2000" dirty="0"/>
+              <a:t>Timing-dependent behavior</a:t>
+            </a:r>
+          </a:p>
+          <a:p>
+            <a:pPr marL="800100" lvl="1" indent="-342900">
+              <a:buFont typeface="Arial" panose="020B0604020202020204" pitchFamily="34" charset="0"/>
+              <a:buChar char="•"/>
+            </a:pPr>
+            <a:r>
+              <a:rPr lang="en-US" sz="2000" dirty="0"/>
+              <a:t>Failures</a:t>
+            </a:r>
+          </a:p>
+          <a:p>
+            <a:pPr marL="800100" lvl="1" indent="-342900">
+              <a:buFont typeface="Arial" panose="020B0604020202020204" pitchFamily="34" charset="0"/>
+              <a:buChar char="•"/>
+            </a:pPr>
+            <a:r>
+              <a:rPr lang="en-US" sz="2000" dirty="0"/>
+              <a:t>Interaction with physical world</a:t>
+            </a:r>
+          </a:p>
+          <a:p>
+            <a:pPr marL="342900" indent="-342900">
+              <a:buFont typeface="Arial" panose="020B0604020202020204" pitchFamily="34" charset="0"/>
+              <a:buChar char="•"/>
+            </a:pPr>
+            <a:r>
+              <a:rPr lang="en-US" sz="2400" dirty="0"/>
+              <a:t>Extremely difficult to reproduce, diagnose, and fix</a:t>
+            </a:r>
+          </a:p>
+          <a:p>
+            <a:pPr marL="342900" indent="-342900">
+              <a:buFont typeface="Arial" panose="020B0604020202020204" pitchFamily="34" charset="0"/>
+              <a:buChar char="•"/>
+            </a:pPr>
+            <a:r>
+              <a:rPr lang="en-US" sz="2400" dirty="0"/>
+              <a:t>Enormous impediment to programmer productivity and software quality</a:t>
+            </a:r>
+          </a:p>
+        </p:txBody>
+      </p:sp>
+    </p:spTree>
+    <p:extLst>
+      <p:ext uri="{BB962C8B-B14F-4D97-AF65-F5344CB8AC3E}">
+        <p14:creationId xmlns:p14="http://schemas.microsoft.com/office/powerpoint/2010/main" val="2734397116"/>
+      </p:ext>
+    </p:extLst>
+  </p:cSld>
+  <p:clrMapOvr>
+    <a:masterClrMapping/>
+  </p:clrMapOvr>
+</p:sld>
+</file>
+
+<file path=ppt/slides/slide20.xml><?xml version="1.0" encoding="utf-8"?>
 <p:sld xmlns:a="http://schemas.openxmlformats.org/drawingml/2006/main" xmlns:r="http://schemas.openxmlformats.org/officeDocument/2006/relationships" xmlns:p="http://schemas.openxmlformats.org/presentationml/2006/main">
   <p:cSld>
     <p:spTree>
@@ -11976,7 +12336,7 @@
 </p:sld>
 </file>
 
-<file path=ppt/slides/slide19.xml><?xml version="1.0" encoding="utf-8"?>
+<file path=ppt/slides/slide21.xml><?xml version="1.0" encoding="utf-8"?>
 <p:sld xmlns:a="http://schemas.openxmlformats.org/drawingml/2006/main" xmlns:r="http://schemas.openxmlformats.org/officeDocument/2006/relationships" xmlns:p="http://schemas.openxmlformats.org/presentationml/2006/main">
   <p:cSld>
     <p:spTree>
@@ -12136,332 +12496,7 @@
 </p:sld>
 </file>
 
-<file path=ppt/slides/slide2.xml><?xml version="1.0" encoding="utf-8"?>
-<p:sld xmlns:a="http://schemas.openxmlformats.org/drawingml/2006/main" xmlns:r="http://schemas.openxmlformats.org/officeDocument/2006/relationships" xmlns:p="http://schemas.openxmlformats.org/presentationml/2006/main">
-  <p:cSld>
-    <p:spTree>
-      <p:nvGrpSpPr>
-        <p:cNvPr id="1" name=""/>
-        <p:cNvGrpSpPr/>
-        <p:nvPr/>
-      </p:nvGrpSpPr>
-      <p:grpSpPr>
-        <a:xfrm>
-          <a:off x="0" y="0"/>
-          <a:ext cx="0" cy="0"/>
-          <a:chOff x="0" y="0"/>
-          <a:chExt cx="0" cy="0"/>
-        </a:xfrm>
-      </p:grpSpPr>
-      <p:sp>
-        <p:nvSpPr>
-          <p:cNvPr id="2" name="Title 1"/>
-          <p:cNvSpPr>
-            <a:spLocks noGrp="1"/>
-          </p:cNvSpPr>
-          <p:nvPr>
-            <p:ph type="title"/>
-          </p:nvPr>
-        </p:nvSpPr>
-        <p:spPr/>
-        <p:txBody>
-          <a:bodyPr/>
-          <a:lstStyle/>
-          <a:p>
-            <a:r>
-              <a:rPr lang="en-US" dirty="0"/>
-              <a:t>The Heisenbug problem</a:t>
-            </a:r>
-          </a:p>
-        </p:txBody>
-      </p:sp>
-      <p:sp>
-        <p:nvSpPr>
-          <p:cNvPr id="6" name="Rectangle 5"/>
-          <p:cNvSpPr/>
-          <p:nvPr/>
-        </p:nvSpPr>
-        <p:spPr>
-          <a:xfrm>
-            <a:off x="5848285" y="2011680"/>
-            <a:ext cx="2225040" cy="1270000"/>
-          </a:xfrm>
-          <a:prstGeom prst="rect">
-            <a:avLst/>
-          </a:prstGeom>
-          <a:noFill/>
-          <a:ln w="25400">
-            <a:solidFill>
-              <a:schemeClr val="tx1"/>
-            </a:solidFill>
-          </a:ln>
-        </p:spPr>
-        <p:style>
-          <a:lnRef idx="2">
-            <a:schemeClr val="accent1">
-              <a:shade val="50000"/>
-            </a:schemeClr>
-          </a:lnRef>
-          <a:fillRef idx="1">
-            <a:schemeClr val="accent1"/>
-          </a:fillRef>
-          <a:effectRef idx="0">
-            <a:schemeClr val="accent1"/>
-          </a:effectRef>
-          <a:fontRef idx="minor">
-            <a:schemeClr val="lt1"/>
-          </a:fontRef>
-        </p:style>
-        <p:txBody>
-          <a:bodyPr rtlCol="0" anchor="ctr"/>
-          <a:lstStyle/>
-          <a:p>
-            <a:pPr algn="ctr"/>
-            <a:endParaRPr lang="en-US"/>
-          </a:p>
-        </p:txBody>
-      </p:sp>
-      <p:sp>
-        <p:nvSpPr>
-          <p:cNvPr id="7" name="TextBox 6"/>
-          <p:cNvSpPr txBox="1"/>
-          <p:nvPr/>
-        </p:nvSpPr>
-        <p:spPr>
-          <a:xfrm>
-            <a:off x="3015991" y="2410460"/>
-            <a:ext cx="1222258" cy="523220"/>
-          </a:xfrm>
-          <a:prstGeom prst="rect">
-            <a:avLst/>
-          </a:prstGeom>
-          <a:noFill/>
-        </p:spPr>
-        <p:txBody>
-          <a:bodyPr wrap="none" rtlCol="0">
-            <a:spAutoFit/>
-          </a:bodyPr>
-          <a:lstStyle/>
-          <a:p>
-            <a:r>
-              <a:rPr lang="en-US" sz="2800" dirty="0"/>
-              <a:t>System</a:t>
-            </a:r>
-          </a:p>
-        </p:txBody>
-      </p:sp>
-      <p:sp>
-        <p:nvSpPr>
-          <p:cNvPr id="8" name="TextBox 7"/>
-          <p:cNvSpPr txBox="1"/>
-          <p:nvPr/>
-        </p:nvSpPr>
-        <p:spPr>
-          <a:xfrm>
-            <a:off x="5933440" y="2410460"/>
-            <a:ext cx="2054730" cy="523220"/>
-          </a:xfrm>
-          <a:prstGeom prst="rect">
-            <a:avLst/>
-          </a:prstGeom>
-          <a:noFill/>
-        </p:spPr>
-        <p:txBody>
-          <a:bodyPr wrap="none" rtlCol="0">
-            <a:spAutoFit/>
-          </a:bodyPr>
-          <a:lstStyle/>
-          <a:p>
-            <a:r>
-              <a:rPr lang="en-US" sz="2800" dirty="0"/>
-              <a:t>Environment</a:t>
-            </a:r>
-          </a:p>
-        </p:txBody>
-      </p:sp>
-      <p:sp>
-        <p:nvSpPr>
-          <p:cNvPr id="9" name="Rectangle 8"/>
-          <p:cNvSpPr/>
-          <p:nvPr/>
-        </p:nvSpPr>
-        <p:spPr>
-          <a:xfrm>
-            <a:off x="2514600" y="2011680"/>
-            <a:ext cx="2225040" cy="1270000"/>
-          </a:xfrm>
-          <a:prstGeom prst="rect">
-            <a:avLst/>
-          </a:prstGeom>
-          <a:noFill/>
-          <a:ln w="25400">
-            <a:solidFill>
-              <a:schemeClr val="tx1"/>
-            </a:solidFill>
-          </a:ln>
-        </p:spPr>
-        <p:style>
-          <a:lnRef idx="2">
-            <a:schemeClr val="accent1">
-              <a:shade val="50000"/>
-            </a:schemeClr>
-          </a:lnRef>
-          <a:fillRef idx="1">
-            <a:schemeClr val="accent1"/>
-          </a:fillRef>
-          <a:effectRef idx="0">
-            <a:schemeClr val="accent1"/>
-          </a:effectRef>
-          <a:fontRef idx="minor">
-            <a:schemeClr val="lt1"/>
-          </a:fontRef>
-        </p:style>
-        <p:txBody>
-          <a:bodyPr rtlCol="0" anchor="ctr"/>
-          <a:lstStyle/>
-          <a:p>
-            <a:pPr algn="ctr"/>
-            <a:endParaRPr lang="en-US"/>
-          </a:p>
-        </p:txBody>
-      </p:sp>
-      <p:cxnSp>
-        <p:nvCxnSpPr>
-          <p:cNvPr id="13" name="Straight Arrow Connector 12"/>
-          <p:cNvCxnSpPr>
-            <a:stCxn id="9" idx="3"/>
-            <a:endCxn id="6" idx="1"/>
-          </p:cNvCxnSpPr>
-          <p:nvPr/>
-        </p:nvCxnSpPr>
-        <p:spPr>
-          <a:xfrm>
-            <a:off x="4739640" y="2646680"/>
-            <a:ext cx="1108645" cy="0"/>
-          </a:xfrm>
-          <a:prstGeom prst="straightConnector1">
-            <a:avLst/>
-          </a:prstGeom>
-          <a:ln w="25400">
-            <a:solidFill>
-              <a:schemeClr val="tx1"/>
-            </a:solidFill>
-            <a:headEnd type="triangle"/>
-            <a:tailEnd type="triangle"/>
-          </a:ln>
-        </p:spPr>
-        <p:style>
-          <a:lnRef idx="1">
-            <a:schemeClr val="accent1"/>
-          </a:lnRef>
-          <a:fillRef idx="0">
-            <a:schemeClr val="accent1"/>
-          </a:fillRef>
-          <a:effectRef idx="0">
-            <a:schemeClr val="accent1"/>
-          </a:effectRef>
-          <a:fontRef idx="minor">
-            <a:schemeClr val="tx1"/>
-          </a:fontRef>
-        </p:style>
-      </p:cxnSp>
-      <p:sp>
-        <p:nvSpPr>
-          <p:cNvPr id="15" name="TextBox 14"/>
-          <p:cNvSpPr txBox="1"/>
-          <p:nvPr/>
-        </p:nvSpPr>
-        <p:spPr>
-          <a:xfrm>
-            <a:off x="1244600" y="3683952"/>
-            <a:ext cx="10170413" cy="2123658"/>
-          </a:xfrm>
-          <a:prstGeom prst="rect">
-            <a:avLst/>
-          </a:prstGeom>
-          <a:noFill/>
-        </p:spPr>
-        <p:txBody>
-          <a:bodyPr wrap="none" rtlCol="0">
-            <a:spAutoFit/>
-          </a:bodyPr>
-          <a:lstStyle/>
-          <a:p>
-            <a:pPr marL="342900" indent="-342900">
-              <a:buFont typeface="Arial" panose="020B0604020202020204" pitchFamily="34" charset="0"/>
-              <a:buChar char="•"/>
-            </a:pPr>
-            <a:r>
-              <a:rPr lang="en-US" sz="2400" dirty="0"/>
-              <a:t>Happen when interaction between system and environment is uncontrollable</a:t>
-            </a:r>
-          </a:p>
-          <a:p>
-            <a:pPr marL="800100" lvl="1" indent="-342900">
-              <a:buFont typeface="Arial" panose="020B0604020202020204" pitchFamily="34" charset="0"/>
-              <a:buChar char="•"/>
-            </a:pPr>
-            <a:r>
-              <a:rPr lang="en-US" sz="2000" dirty="0"/>
-              <a:t>Timing-dependent behavior</a:t>
-            </a:r>
-          </a:p>
-          <a:p>
-            <a:pPr marL="800100" lvl="1" indent="-342900">
-              <a:buFont typeface="Arial" panose="020B0604020202020204" pitchFamily="34" charset="0"/>
-              <a:buChar char="•"/>
-            </a:pPr>
-            <a:r>
-              <a:rPr lang="en-US" sz="2000" dirty="0"/>
-              <a:t>Failures</a:t>
-            </a:r>
-          </a:p>
-          <a:p>
-            <a:pPr marL="800100" lvl="1" indent="-342900">
-              <a:buFont typeface="Arial" panose="020B0604020202020204" pitchFamily="34" charset="0"/>
-              <a:buChar char="•"/>
-            </a:pPr>
-            <a:r>
-              <a:rPr lang="en-US" sz="2000" dirty="0"/>
-              <a:t>Physical world, more generally</a:t>
-            </a:r>
-          </a:p>
-          <a:p>
-            <a:pPr marL="342900" indent="-342900">
-              <a:buFont typeface="Arial" panose="020B0604020202020204" pitchFamily="34" charset="0"/>
-              <a:buChar char="•"/>
-            </a:pPr>
-            <a:r>
-              <a:rPr lang="en-US" sz="2400" dirty="0"/>
-              <a:t>Extremely difficult to reproduce, diagnose, and fix</a:t>
-            </a:r>
-          </a:p>
-          <a:p>
-            <a:pPr marL="342900" indent="-342900">
-              <a:buFont typeface="Arial" panose="020B0604020202020204" pitchFamily="34" charset="0"/>
-              <a:buChar char="•"/>
-            </a:pPr>
-            <a:r>
-              <a:rPr lang="en-US" sz="2400" dirty="0"/>
-              <a:t>Enormous impediment to programmer productivity and software quality</a:t>
-            </a:r>
-          </a:p>
-        </p:txBody>
-      </p:sp>
-    </p:spTree>
-    <p:extLst>
-      <p:ext uri="{BB962C8B-B14F-4D97-AF65-F5344CB8AC3E}">
-        <p14:creationId xmlns:p14="http://schemas.microsoft.com/office/powerpoint/2010/main" val="2734397116"/>
-      </p:ext>
-    </p:extLst>
-  </p:cSld>
-  <p:clrMapOvr>
-    <a:masterClrMapping/>
-  </p:clrMapOvr>
-</p:sld>
-</file>
-
-<file path=ppt/slides/slide20.xml><?xml version="1.0" encoding="utf-8"?>
+<file path=ppt/slides/slide22.xml><?xml version="1.0" encoding="utf-8"?>
 <p:sld xmlns:a="http://schemas.openxmlformats.org/drawingml/2006/main" xmlns:r="http://schemas.openxmlformats.org/officeDocument/2006/relationships" xmlns:p="http://schemas.openxmlformats.org/presentationml/2006/main">
   <p:cSld>
     <p:spTree>
@@ -12542,7 +12577,7 @@
 </p:sld>
 </file>
 
-<file path=ppt/slides/slide21.xml><?xml version="1.0" encoding="utf-8"?>
+<file path=ppt/slides/slide23.xml><?xml version="1.0" encoding="utf-8"?>
 <p:sld xmlns:a="http://schemas.openxmlformats.org/drawingml/2006/main" xmlns:r="http://schemas.openxmlformats.org/officeDocument/2006/relationships" xmlns:p="http://schemas.openxmlformats.org/presentationml/2006/main">
   <p:cSld>
     <p:spTree>
@@ -17569,7 +17604,7 @@
         <p:spPr>
           <a:xfrm>
             <a:off x="1238864" y="1727363"/>
-            <a:ext cx="3247556" cy="4524315"/>
+            <a:ext cx="3247556" cy="4093428"/>
           </a:xfrm>
           <a:prstGeom prst="rect">
             <a:avLst/>
@@ -17592,6 +17627,7 @@
             </a:r>
           </a:p>
           <a:p>
+            <a:pPr lvl="0"/>
             <a:endParaRPr lang="en-US" sz="2800" dirty="0"/>
           </a:p>
           <a:p>
@@ -17621,9 +17657,6 @@
               <a:rPr lang="en-US" sz="2800" dirty="0"/>
               <a:t>Hid class</a:t>
             </a:r>
-          </a:p>
-          <a:p>
-            <a:endParaRPr lang="en-US" sz="2800" dirty="0"/>
           </a:p>
           <a:p>
             <a:pPr lvl="0"/>
@@ -17657,7 +17690,7 @@
         <p:spPr>
           <a:xfrm>
             <a:off x="5331541" y="1727363"/>
-            <a:ext cx="2132763" cy="1938992"/>
+            <a:ext cx="3171189" cy="3231654"/>
           </a:xfrm>
           <a:prstGeom prst="rect">
             <a:avLst/>
@@ -17694,6 +17727,24 @@
               <a:t>Batch Service</a:t>
             </a:r>
           </a:p>
+          <a:p>
+            <a:r>
+              <a:rPr lang="en-US" sz="2800" dirty="0"/>
+              <a:t>Learning Service</a:t>
+            </a:r>
+          </a:p>
+          <a:p>
+            <a:r>
+              <a:rPr lang="en-US" sz="2800" dirty="0"/>
+              <a:t>AZSM</a:t>
+            </a:r>
+          </a:p>
+          <a:p>
+            <a:r>
+              <a:rPr lang="en-US" sz="2800" dirty="0"/>
+              <a:t>CAT (Connected Car)</a:t>
+            </a:r>
+          </a:p>
         </p:txBody>
       </p:sp>
       <p:sp>
@@ -17704,8 +17755,8 @@
         </p:nvSpPr>
         <p:spPr>
           <a:xfrm>
-            <a:off x="8200102" y="1727363"/>
-            <a:ext cx="2232599" cy="1938992"/>
+            <a:off x="8596342" y="1727363"/>
+            <a:ext cx="2673809" cy="1508105"/>
           </a:xfrm>
           <a:prstGeom prst="rect">
             <a:avLst/>
@@ -17733,55 +17784,7 @@
           <a:p>
             <a:r>
               <a:rPr lang="en-US" sz="2800" dirty="0"/>
-              <a:t>P++</a:t>
-            </a:r>
-          </a:p>
-          <a:p>
-            <a:r>
-              <a:rPr lang="en-US" sz="2800" dirty="0"/>
-              <a:t>P-style testing</a:t>
-            </a:r>
-          </a:p>
-        </p:txBody>
-      </p:sp>
-      <p:sp>
-        <p:nvSpPr>
-          <p:cNvPr id="3" name="TextBox 2"/>
-          <p:cNvSpPr txBox="1"/>
-          <p:nvPr/>
-        </p:nvSpPr>
-        <p:spPr>
-          <a:xfrm>
-            <a:off x="5405283" y="4802404"/>
-            <a:ext cx="1911101" cy="1354217"/>
-          </a:xfrm>
-          <a:prstGeom prst="rect">
-            <a:avLst/>
-          </a:prstGeom>
-          <a:noFill/>
-        </p:spPr>
-        <p:txBody>
-          <a:bodyPr wrap="none" rtlCol="0">
-            <a:spAutoFit/>
-          </a:bodyPr>
-          <a:lstStyle/>
-          <a:p>
-            <a:r>
-              <a:rPr lang="en-US" sz="3600" dirty="0">
-                <a:solidFill>
-                  <a:srgbClr val="FF0000"/>
-                </a:solidFill>
-              </a:rPr>
-              <a:t>HoloLens</a:t>
-            </a:r>
-          </a:p>
-          <a:p>
-            <a:endParaRPr lang="en-US" dirty="0"/>
-          </a:p>
-          <a:p>
-            <a:r>
-              <a:rPr lang="en-US" sz="2800" dirty="0"/>
-              <a:t>DMA driver</a:t>
+              <a:t>Client-server app</a:t>
             </a:r>
           </a:p>
         </p:txBody>
@@ -17808,7 +17811,7 @@
           <a:p>
             <a:r>
               <a:rPr lang="en-US" dirty="0"/>
-              <a:t>Tons of experience</a:t>
+              <a:t>Users</a:t>
             </a:r>
           </a:p>
         </p:txBody>
@@ -18030,7 +18033,7 @@
           <a:p>
             <a:r>
               <a:rPr lang="en-US" dirty="0"/>
-              <a:t>Expressing asynchrony in P</a:t>
+              <a:t>Outline</a:t>
             </a:r>
           </a:p>
         </p:txBody>
@@ -18047,48 +18050,82 @@
         </p:nvSpPr>
         <p:spPr/>
         <p:txBody>
-          <a:bodyPr/>
+          <a:bodyPr>
+            <a:normAutofit lnSpcReduction="10000"/>
+          </a:bodyPr>
           <a:lstStyle/>
           <a:p>
             <a:r>
               <a:rPr lang="en-US" dirty="0"/>
-              <a:t>Ping Pong example with Timer</a:t>
-            </a:r>
-          </a:p>
-          <a:p>
+              <a:t>State machine programming model and language features</a:t>
+            </a:r>
+          </a:p>
+          <a:p>
+            <a:pPr lvl="1"/>
             <a:r>
               <a:rPr lang="en-US" dirty="0"/>
-              <a:t>Illustrate basic language features</a:t>
+              <a:t>Hello</a:t>
             </a:r>
           </a:p>
           <a:p>
             <a:r>
               <a:rPr lang="en-US" dirty="0"/>
-              <a:t>Get students familiar with basic tool chain</a:t>
-            </a:r>
+              <a:t>Safety and liveness specifications</a:t>
+            </a:r>
+          </a:p>
+          <a:p>
+            <a:pPr lvl="1"/>
+            <a:r>
+              <a:rPr lang="en-US" dirty="0" err="1"/>
+              <a:t>PingPong</a:t>
+            </a:r>
+            <a:endParaRPr lang="en-US" dirty="0"/>
           </a:p>
           <a:p>
             <a:r>
               <a:rPr lang="en-US" dirty="0"/>
-              <a:t>The problem of systematic testing</a:t>
-            </a:r>
-          </a:p>
-          <a:p>
+              <a:t>Unit interaction tests</a:t>
+            </a:r>
+          </a:p>
+          <a:p>
+            <a:pPr lvl="1"/>
+            <a:r>
+              <a:rPr lang="en-US" dirty="0" err="1"/>
+              <a:t>PingPong</a:t>
+            </a:r>
             <a:r>
               <a:rPr lang="en-US" dirty="0"/>
-              <a:t>The problem of specification</a:t>
+              <a:t>, Failover</a:t>
             </a:r>
           </a:p>
           <a:p>
             <a:r>
               <a:rPr lang="en-US" dirty="0"/>
-              <a:t>Safety</a:t>
-            </a:r>
-          </a:p>
-          <a:p>
+              <a:t>Failure modeling</a:t>
+            </a:r>
+          </a:p>
+          <a:p>
+            <a:pPr lvl="1"/>
             <a:r>
               <a:rPr lang="en-US" dirty="0"/>
-              <a:t>Liveness</a:t>
+              <a:t>Failover</a:t>
+            </a:r>
+          </a:p>
+          <a:p>
+            <a:r>
+              <a:rPr lang="en-US" dirty="0"/>
+              <a:t>Avoiding data races</a:t>
+            </a:r>
+          </a:p>
+          <a:p>
+            <a:pPr lvl="1"/>
+            <a:r>
+              <a:rPr lang="en-US" dirty="0" err="1"/>
+              <a:t>CoarseGrainedLocking</a:t>
+            </a:r>
+            <a:r>
+              <a:rPr lang="en-US" dirty="0"/>
+              <a:t> </a:t>
             </a:r>
           </a:p>
         </p:txBody>
@@ -18096,7 +18133,7 @@
     </p:spTree>
     <p:extLst>
       <p:ext uri="{BB962C8B-B14F-4D97-AF65-F5344CB8AC3E}">
-        <p14:creationId xmlns:p14="http://schemas.microsoft.com/office/powerpoint/2010/main" val="369208347"/>
+        <p14:creationId xmlns:p14="http://schemas.microsoft.com/office/powerpoint/2010/main" val="777189268"/>
       </p:ext>
     </p:extLst>
   </p:cSld>

</xml_diff>